<commit_message>
IoT Central REST arch image
</commit_message>
<xml_diff>
--- a/samples/IoT_Central_REST_Hvac_Control/Hvac.Control.JavaScript.REST.Client/architecture.pptx
+++ b/samples/IoT_Central_REST_Hvac_Control/Hvac.Control.JavaScript.REST.Client/architecture.pptx
@@ -5,10 +5,11 @@
     <p:sldMasterId id="2147483660" r:id="rId1"/>
   </p:sldMasterIdLst>
   <p:notesMasterIdLst>
-    <p:notesMasterId r:id="rId3"/>
+    <p:notesMasterId r:id="rId4"/>
   </p:notesMasterIdLst>
   <p:sldIdLst>
     <p:sldId id="2076138166" r:id="rId2"/>
+    <p:sldId id="2076138167" r:id="rId3"/>
   </p:sldIdLst>
   <p:sldSz cx="12192000" cy="6858000"/>
   <p:notesSz cx="6858000" cy="9144000"/>
@@ -197,7 +198,7 @@
           <a:p>
             <a:fld id="{EA730229-60E1-4812-B198-8EFB4471888B}" type="datetimeFigureOut">
               <a:rPr lang="en-AU" smtClean="0"/>
-              <a:t>1/11/2020</a:t>
+              <a:t>16/11/2020</a:t>
             </a:fld>
             <a:endParaRPr lang="en-AU"/>
           </a:p>
@@ -614,6 +615,169 @@
         </p:txBody>
       </p:sp>
     </p:spTree>
+  </p:cSld>
+  <p:clrMapOvr>
+    <a:masterClrMapping/>
+  </p:clrMapOvr>
+</p:notes>
+</file>
+
+<file path=ppt/notesSlides/notesSlide2.xml><?xml version="1.0" encoding="utf-8"?>
+<p:notes xmlns:a="http://schemas.openxmlformats.org/drawingml/2006/main" xmlns:r="http://schemas.openxmlformats.org/officeDocument/2006/relationships" xmlns:p="http://schemas.openxmlformats.org/presentationml/2006/main">
+  <p:cSld>
+    <p:spTree>
+      <p:nvGrpSpPr>
+        <p:cNvPr id="1" name=""/>
+        <p:cNvGrpSpPr/>
+        <p:nvPr/>
+      </p:nvGrpSpPr>
+      <p:grpSpPr>
+        <a:xfrm>
+          <a:off x="0" y="0"/>
+          <a:ext cx="0" cy="0"/>
+          <a:chOff x="0" y="0"/>
+          <a:chExt cx="0" cy="0"/>
+        </a:xfrm>
+      </p:grpSpPr>
+      <p:sp>
+        <p:nvSpPr>
+          <p:cNvPr id="2" name="Slide Image Placeholder 1"/>
+          <p:cNvSpPr>
+            <a:spLocks noGrp="1" noRot="1" noChangeAspect="1"/>
+          </p:cNvSpPr>
+          <p:nvPr>
+            <p:ph type="sldImg"/>
+          </p:nvPr>
+        </p:nvSpPr>
+        <p:spPr>
+          <a:xfrm>
+            <a:off x="138113" y="1347788"/>
+            <a:ext cx="6462712" cy="3636962"/>
+          </a:xfrm>
+        </p:spPr>
+      </p:sp>
+      <p:sp>
+        <p:nvSpPr>
+          <p:cNvPr id="3" name="Notes Placeholder 2"/>
+          <p:cNvSpPr>
+            <a:spLocks noGrp="1"/>
+          </p:cNvSpPr>
+          <p:nvPr>
+            <p:ph type="body" idx="1"/>
+          </p:nvPr>
+        </p:nvSpPr>
+        <p:spPr/>
+        <p:txBody>
+          <a:bodyPr>
+            <a:normAutofit/>
+          </a:bodyPr>
+          <a:lstStyle/>
+          <a:p>
+            <a:r>
+              <a:rPr lang="en-AU"/>
+              <a:t>Change the rate the sensor </a:t>
+            </a:r>
+            <a:r>
+              <a:rPr lang="en-AU" err="1"/>
+              <a:t>os</a:t>
+            </a:r>
+            <a:r>
+              <a:rPr lang="en-AU"/>
+              <a:t> measured</a:t>
+            </a:r>
+            <a:endParaRPr/>
+          </a:p>
+        </p:txBody>
+      </p:sp>
+      <p:sp>
+        <p:nvSpPr>
+          <p:cNvPr id="4" name="Slide Number Placeholder 3"/>
+          <p:cNvSpPr>
+            <a:spLocks noGrp="1"/>
+          </p:cNvSpPr>
+          <p:nvPr>
+            <p:ph type="sldNum" sz="quarter" idx="10"/>
+          </p:nvPr>
+        </p:nvSpPr>
+        <p:spPr/>
+        <p:txBody>
+          <a:bodyPr/>
+          <a:lstStyle/>
+          <a:p>
+            <a:pPr marL="0" marR="0" lvl="0" indent="0" algn="r" defTabSz="914400" rtl="0" eaLnBrk="1" fontAlgn="auto" latinLnBrk="0" hangingPunct="1">
+              <a:lnSpc>
+                <a:spcPct val="100000"/>
+              </a:lnSpc>
+              <a:spcBef>
+                <a:spcPts val="0"/>
+              </a:spcBef>
+              <a:spcAft>
+                <a:spcPts val="0"/>
+              </a:spcAft>
+              <a:buClrTx/>
+              <a:buSzTx/>
+              <a:buFontTx/>
+              <a:buNone/>
+              <a:tabLst/>
+              <a:defRPr/>
+            </a:pPr>
+            <a:fld id="{6101C5E1-D8E9-464D-A93E-CE21651935A7}" type="slidenum">
+              <a:rPr kumimoji="0" lang="en-US" sz="1200" b="0" i="0" u="none" strike="noStrike" kern="1200" cap="none" spc="0" normalizeH="0" baseline="0" noProof="0" smtClean="0">
+                <a:ln>
+                  <a:noFill/>
+                </a:ln>
+                <a:solidFill>
+                  <a:prstClr val="black"/>
+                </a:solidFill>
+                <a:effectLst/>
+                <a:uLnTx/>
+                <a:uFillTx/>
+                <a:latin typeface="Calibri"/>
+                <a:ea typeface="+mn-ea"/>
+                <a:cs typeface="Arial" pitchFamily="34" charset="0"/>
+              </a:rPr>
+              <a:pPr marL="0" marR="0" lvl="0" indent="0" algn="r" defTabSz="914400" rtl="0" eaLnBrk="1" fontAlgn="auto" latinLnBrk="0" hangingPunct="1">
+                <a:lnSpc>
+                  <a:spcPct val="100000"/>
+                </a:lnSpc>
+                <a:spcBef>
+                  <a:spcPts val="0"/>
+                </a:spcBef>
+                <a:spcAft>
+                  <a:spcPts val="0"/>
+                </a:spcAft>
+                <a:buClrTx/>
+                <a:buSzTx/>
+                <a:buFontTx/>
+                <a:buNone/>
+                <a:tabLst/>
+                <a:defRPr/>
+              </a:pPr>
+              <a:t>2</a:t>
+            </a:fld>
+            <a:endParaRPr kumimoji="0" lang="en-US" sz="1200" b="0" i="0" u="none" strike="noStrike" kern="1200" cap="none" spc="0" normalizeH="0" baseline="0" noProof="0">
+              <a:ln>
+                <a:noFill/>
+              </a:ln>
+              <a:solidFill>
+                <a:prstClr val="black"/>
+              </a:solidFill>
+              <a:effectLst/>
+              <a:uLnTx/>
+              <a:uFillTx/>
+              <a:latin typeface="Calibri"/>
+              <a:ea typeface="+mn-ea"/>
+              <a:cs typeface="Arial" pitchFamily="34" charset="0"/>
+            </a:endParaRPr>
+          </a:p>
+        </p:txBody>
+      </p:sp>
+    </p:spTree>
+    <p:extLst>
+      <p:ext uri="{BB962C8B-B14F-4D97-AF65-F5344CB8AC3E}">
+        <p14:creationId xmlns:p14="http://schemas.microsoft.com/office/powerpoint/2010/main" val="785861816"/>
+      </p:ext>
+    </p:extLst>
   </p:cSld>
   <p:clrMapOvr>
     <a:masterClrMapping/>
@@ -12770,7 +12934,7 @@
             <a:fld id="{B3D10869-6060-4E47-B931-1432A5FBCBE3}" type="datetimeFigureOut">
               <a:rPr lang="en-US" smtClean="0"/>
               <a:pPr/>
-              <a:t>11/1/2020</a:t>
+              <a:t>11/16/2020</a:t>
             </a:fld>
             <a:endParaRPr lang="en-US"/>
           </a:p>
@@ -21480,6 +21644,3153 @@
 </p:sld>
 </file>
 
+<file path=ppt/slides/slide2.xml><?xml version="1.0" encoding="utf-8"?>
+<p:sld xmlns:a="http://schemas.openxmlformats.org/drawingml/2006/main" xmlns:r="http://schemas.openxmlformats.org/officeDocument/2006/relationships" xmlns:p="http://schemas.openxmlformats.org/presentationml/2006/main">
+  <p:cSld>
+    <p:spTree>
+      <p:nvGrpSpPr>
+        <p:cNvPr id="1" name=""/>
+        <p:cNvGrpSpPr/>
+        <p:nvPr/>
+      </p:nvGrpSpPr>
+      <p:grpSpPr>
+        <a:xfrm>
+          <a:off x="0" y="0"/>
+          <a:ext cx="0" cy="0"/>
+          <a:chOff x="0" y="0"/>
+          <a:chExt cx="0" cy="0"/>
+        </a:xfrm>
+      </p:grpSpPr>
+      <p:sp>
+        <p:nvSpPr>
+          <p:cNvPr id="5" name="TextBox"/>
+          <p:cNvSpPr txBox="1">
+            <a:spLocks noGrp="1" noSelect="1" noRot="1" noMove="1"/>
+          </p:cNvSpPr>
+          <p:nvPr/>
+        </p:nvSpPr>
+        <p:spPr>
+          <a:xfrm>
+            <a:off x="2890520" y="2644140"/>
+            <a:ext cx="6411372" cy="1569660"/>
+          </a:xfrm>
+          <a:prstGeom prst="rect">
+            <a:avLst/>
+          </a:prstGeom>
+          <a:noFill/>
+        </p:spPr>
+        <p:txBody>
+          <a:bodyPr wrap="none" rtlCol="0" anchor="ctr" anchorCtr="1">
+            <a:spAutoFit/>
+          </a:bodyPr>
+          <a:lstStyle>
+            <a:lvl1pPr algn="l">
+              <a:lnSpc>
+                <a:spcPct val="150000"/>
+              </a:lnSpc>
+              <a:spcBef>
+                <a:spcPct val="0"/>
+              </a:spcBef>
+              <a:spcAft>
+                <a:spcPct val="0"/>
+              </a:spcAft>
+              <a:defRPr lang="en-US" sz="3200" b="1" noProof="1" dirty="0">
+                <a:solidFill>
+                  <a:prstClr val="red">
+                    <a:lumOff val="30000"/>
+                    <a:alpha val="40000"/>
+                  </a:prstClr>
+                </a:solidFill>
+                <a:effectLst>
+                  <a:outerShdw blurRad="50800" dist="38100" algn="tr" rotWithShape="0">
+                    <a:prstClr val="black">
+                      <a:alpha val="80000"/>
+                    </a:prstClr>
+                  </a:outerShdw>
+                </a:effectLst>
+                <a:latin typeface="Calibri" pitchFamily="34" charset="0"/>
+              </a:defRPr>
+            </a:lvl1pPr>
+          </a:lstStyle>
+          <a:p>
+            <a:pPr marL="0" marR="0" lvl="0" indent="0" algn="ctr" defTabSz="914400" rtl="0" eaLnBrk="1" fontAlgn="auto" latinLnBrk="0" hangingPunct="1">
+              <a:lnSpc>
+                <a:spcPct val="150000"/>
+              </a:lnSpc>
+              <a:spcBef>
+                <a:spcPct val="0"/>
+              </a:spcBef>
+              <a:spcAft>
+                <a:spcPct val="0"/>
+              </a:spcAft>
+              <a:buClrTx/>
+              <a:buSzTx/>
+              <a:buFontTx/>
+              <a:buNone/>
+              <a:tabLst/>
+              <a:defRPr/>
+            </a:pPr>
+            <a:endParaRPr kumimoji="0" lang="en-US" sz="3200" b="1" i="0" u="none" strike="noStrike" kern="1200" cap="none" spc="0" normalizeH="0" baseline="0" noProof="1">
+              <a:ln>
+                <a:noFill/>
+              </a:ln>
+              <a:solidFill>
+                <a:prstClr val="red">
+                  <a:lumOff val="30000"/>
+                  <a:alpha val="40000"/>
+                </a:prstClr>
+              </a:solidFill>
+              <a:effectLst>
+                <a:outerShdw blurRad="50800" dist="38100" algn="tr" rotWithShape="0">
+                  <a:prstClr val="black">
+                    <a:alpha val="80000"/>
+                  </a:prstClr>
+                </a:outerShdw>
+              </a:effectLst>
+              <a:uLnTx/>
+              <a:uFillTx/>
+              <a:latin typeface="Calibri" pitchFamily="34" charset="0"/>
+              <a:cs typeface="Arial" pitchFamily="34" charset="0"/>
+            </a:endParaRPr>
+          </a:p>
+          <a:p>
+            <a:pPr marL="0" marR="0" lvl="0" indent="0" algn="ctr" defTabSz="914400" rtl="0" eaLnBrk="1" fontAlgn="auto" latinLnBrk="0" hangingPunct="1">
+              <a:lnSpc>
+                <a:spcPct val="150000"/>
+              </a:lnSpc>
+              <a:spcBef>
+                <a:spcPct val="0"/>
+              </a:spcBef>
+              <a:spcAft>
+                <a:spcPct val="0"/>
+              </a:spcAft>
+              <a:buClrTx/>
+              <a:buSzTx/>
+              <a:buFontTx/>
+              <a:buNone/>
+              <a:tabLst/>
+              <a:defRPr/>
+            </a:pPr>
+            <a:endParaRPr kumimoji="0" lang="en-US" sz="3200" b="1" i="0" u="none" strike="noStrike" kern="1200" cap="none" spc="0" normalizeH="0" baseline="0" noProof="1">
+              <a:ln>
+                <a:noFill/>
+              </a:ln>
+              <a:solidFill>
+                <a:prstClr val="red">
+                  <a:lumOff val="30000"/>
+                  <a:alpha val="40000"/>
+                </a:prstClr>
+              </a:solidFill>
+              <a:effectLst>
+                <a:outerShdw blurRad="50800" dist="38100" algn="tr" rotWithShape="0">
+                  <a:prstClr val="black">
+                    <a:alpha val="80000"/>
+                  </a:prstClr>
+                </a:outerShdw>
+              </a:effectLst>
+              <a:uLnTx/>
+              <a:uFillTx/>
+              <a:latin typeface="Calibri" pitchFamily="34" charset="0"/>
+              <a:cs typeface="Arial" pitchFamily="34" charset="0"/>
+            </a:endParaRPr>
+          </a:p>
+          <a:p>
+            <a:pPr marL="0" marR="0" lvl="0" indent="0" algn="ctr" defTabSz="914400" rtl="0" eaLnBrk="1" fontAlgn="auto" latinLnBrk="0" hangingPunct="1">
+              <a:lnSpc>
+                <a:spcPct val="150000"/>
+              </a:lnSpc>
+              <a:spcBef>
+                <a:spcPct val="0"/>
+              </a:spcBef>
+              <a:spcAft>
+                <a:spcPct val="0"/>
+              </a:spcAft>
+              <a:buClrTx/>
+              <a:buSzTx/>
+              <a:buFontTx/>
+              <a:buNone/>
+              <a:tabLst/>
+              <a:defRPr/>
+            </a:pPr>
+            <a:endParaRPr kumimoji="0" lang="en-US" sz="3200" b="1" i="0" u="none" strike="noStrike" kern="1200" cap="none" spc="0" normalizeH="0" baseline="0" noProof="1">
+              <a:ln>
+                <a:noFill/>
+              </a:ln>
+              <a:solidFill>
+                <a:prstClr val="red">
+                  <a:lumOff val="30000"/>
+                  <a:alpha val="40000"/>
+                </a:prstClr>
+              </a:solidFill>
+              <a:effectLst>
+                <a:outerShdw blurRad="50800" dist="38100" algn="tr" rotWithShape="0">
+                  <a:prstClr val="black">
+                    <a:alpha val="80000"/>
+                  </a:prstClr>
+                </a:outerShdw>
+              </a:effectLst>
+              <a:uLnTx/>
+              <a:uFillTx/>
+              <a:latin typeface="Calibri" pitchFamily="34" charset="0"/>
+              <a:cs typeface="Arial" pitchFamily="34" charset="0"/>
+            </a:endParaRPr>
+          </a:p>
+        </p:txBody>
+      </p:sp>
+      <p:pic>
+        <p:nvPicPr>
+          <p:cNvPr id="2" name="Picture 2" descr="Things I Learnt in My First Azure Functions Project">
+            <a:extLst>
+              <a:ext uri="{FF2B5EF4-FFF2-40B4-BE49-F238E27FC236}">
+                <a16:creationId xmlns:a16="http://schemas.microsoft.com/office/drawing/2014/main" id="{05F01EE1-5889-472F-867B-BE28BB00AF41}"/>
+              </a:ext>
+            </a:extLst>
+          </p:cNvPr>
+          <p:cNvPicPr>
+            <a:picLocks noChangeAspect="1" noChangeArrowheads="1"/>
+          </p:cNvPicPr>
+          <p:nvPr/>
+        </p:nvPicPr>
+        <p:blipFill rotWithShape="1">
+          <a:blip r:embed="rId3">
+            <a:extLst>
+              <a:ext uri="{BEBA8EAE-BF5A-486C-A8C5-ECC9F3942E4B}">
+                <a14:imgProps xmlns:a14="http://schemas.microsoft.com/office/drawing/2010/main">
+                  <a14:imgLayer r:embed="rId4">
+                    <a14:imgEffect>
+                      <a14:backgroundRemoval t="7154" b="96870" l="19500" r="86300">
+                        <a14:foregroundMark x1="31700" y1="29955" x2="31700" y2="29955"/>
+                        <a14:foregroundMark x1="23200" y1="58271" x2="30500" y2="68256"/>
+                        <a14:foregroundMark x1="20100" y1="49180" x2="19500" y2="50969"/>
+                        <a14:foregroundMark x1="83800" y1="52757" x2="83800" y2="52757"/>
+                        <a14:foregroundMark x1="54400" y1="7154" x2="54400" y2="7154"/>
+                        <a14:foregroundMark x1="75200" y1="32638" x2="75200" y2="32638"/>
+                        <a14:foregroundMark x1="76500" y1="34575" x2="76500" y2="34575"/>
+                        <a14:foregroundMark x1="69100" y1="25335" x2="81400" y2="41878"/>
+                        <a14:foregroundMark x1="67300" y1="75559" x2="79500" y2="60060"/>
+                        <a14:foregroundMark x1="86300" y1="50075" x2="86300" y2="50075"/>
+                        <a14:foregroundMark x1="41600" y1="92846" x2="41600" y2="92846"/>
+                        <a14:foregroundMark x1="40200" y1="96870" x2="40200" y2="96870"/>
+                        <a14:backgroundMark x1="36600" y1="55589" x2="36600" y2="55589"/>
+                        <a14:backgroundMark x1="36000" y1="38152" x2="41500" y2="60060"/>
+                      </a14:backgroundRemoval>
+                    </a14:imgEffect>
+                  </a14:imgLayer>
+                </a14:imgProps>
+              </a:ext>
+              <a:ext uri="{28A0092B-C50C-407E-A947-70E740481C1C}">
+                <a14:useLocalDpi xmlns:a14="http://schemas.microsoft.com/office/drawing/2010/main" val="0"/>
+              </a:ext>
+            </a:extLst>
+          </a:blip>
+          <a:srcRect l="16300" r="11300"/>
+          <a:stretch/>
+        </p:blipFill>
+        <p:spPr bwMode="auto">
+          <a:xfrm>
+            <a:off x="2439068" y="536784"/>
+            <a:ext cx="1010308" cy="936350"/>
+          </a:xfrm>
+          <a:prstGeom prst="rect">
+            <a:avLst/>
+          </a:prstGeom>
+          <a:noFill/>
+          <a:effectLst>
+            <a:outerShdw blurRad="50800" dist="38100" dir="2700000" algn="tl" rotWithShape="0">
+              <a:prstClr val="black">
+                <a:alpha val="40000"/>
+              </a:prstClr>
+            </a:outerShdw>
+          </a:effectLst>
+          <a:extLst>
+            <a:ext uri="{909E8E84-426E-40DD-AFC4-6F175D3DCCD1}">
+              <a14:hiddenFill xmlns:a14="http://schemas.microsoft.com/office/drawing/2010/main">
+                <a:solidFill>
+                  <a:srgbClr val="FFFFFF"/>
+                </a:solidFill>
+              </a14:hiddenFill>
+            </a:ext>
+          </a:extLst>
+        </p:spPr>
+      </p:pic>
+      <p:pic>
+        <p:nvPicPr>
+          <p:cNvPr id="3" name="Picture 2">
+            <a:extLst>
+              <a:ext uri="{FF2B5EF4-FFF2-40B4-BE49-F238E27FC236}">
+                <a16:creationId xmlns:a16="http://schemas.microsoft.com/office/drawing/2014/main" id="{577BBEFF-4F23-49EB-839F-AECA194BAEDD}"/>
+              </a:ext>
+            </a:extLst>
+          </p:cNvPr>
+          <p:cNvPicPr>
+            <a:picLocks noChangeAspect="1"/>
+          </p:cNvPicPr>
+          <p:nvPr/>
+        </p:nvPicPr>
+        <p:blipFill rotWithShape="1">
+          <a:blip r:embed="rId5"/>
+          <a:srcRect l="1" t="1" r="39729" b="-12581"/>
+          <a:stretch/>
+        </p:blipFill>
+        <p:spPr>
+          <a:xfrm>
+            <a:off x="2004168" y="1876458"/>
+            <a:ext cx="1880108" cy="2988635"/>
+          </a:xfrm>
+          <a:prstGeom prst="rect">
+            <a:avLst/>
+          </a:prstGeom>
+        </p:spPr>
+      </p:pic>
+      <p:pic>
+        <p:nvPicPr>
+          <p:cNvPr id="6" name="Picture 12" descr="Archiving Data with Azure Blob Storage Archive Tier and PowerShell ...">
+            <a:extLst>
+              <a:ext uri="{FF2B5EF4-FFF2-40B4-BE49-F238E27FC236}">
+                <a16:creationId xmlns:a16="http://schemas.microsoft.com/office/drawing/2014/main" id="{6090DDF5-6A0A-4F3C-BD35-8241BDD8EF2B}"/>
+              </a:ext>
+            </a:extLst>
+          </p:cNvPr>
+          <p:cNvPicPr>
+            <a:picLocks noChangeAspect="1" noChangeArrowheads="1"/>
+          </p:cNvPicPr>
+          <p:nvPr/>
+        </p:nvPicPr>
+        <p:blipFill rotWithShape="1">
+          <a:blip r:embed="rId6">
+            <a:extLst>
+              <a:ext uri="{28A0092B-C50C-407E-A947-70E740481C1C}">
+                <a14:useLocalDpi xmlns:a14="http://schemas.microsoft.com/office/drawing/2010/main" val="0"/>
+              </a:ext>
+            </a:extLst>
+          </a:blip>
+          <a:srcRect r="54580"/>
+          <a:stretch/>
+        </p:blipFill>
+        <p:spPr bwMode="auto">
+          <a:xfrm>
+            <a:off x="822836" y="648325"/>
+            <a:ext cx="826616" cy="702130"/>
+          </a:xfrm>
+          <a:prstGeom prst="rect">
+            <a:avLst/>
+          </a:prstGeom>
+          <a:noFill/>
+          <a:effectLst>
+            <a:outerShdw blurRad="50800" dist="38100" dir="2700000" algn="tl" rotWithShape="0">
+              <a:prstClr val="black">
+                <a:alpha val="40000"/>
+              </a:prstClr>
+            </a:outerShdw>
+          </a:effectLst>
+          <a:extLst>
+            <a:ext uri="{909E8E84-426E-40DD-AFC4-6F175D3DCCD1}">
+              <a14:hiddenFill xmlns:a14="http://schemas.microsoft.com/office/drawing/2010/main">
+                <a:solidFill>
+                  <a:srgbClr val="FFFFFF"/>
+                </a:solidFill>
+              </a14:hiddenFill>
+            </a:ext>
+          </a:extLst>
+        </p:spPr>
+      </p:pic>
+      <p:cxnSp>
+        <p:nvCxnSpPr>
+          <p:cNvPr id="46" name="Straight Arrow Connector 45">
+            <a:extLst>
+              <a:ext uri="{FF2B5EF4-FFF2-40B4-BE49-F238E27FC236}">
+                <a16:creationId xmlns:a16="http://schemas.microsoft.com/office/drawing/2014/main" id="{9E5F8826-8822-455E-AAB8-E951D0143660}"/>
+              </a:ext>
+            </a:extLst>
+          </p:cNvPr>
+          <p:cNvCxnSpPr>
+            <a:cxnSpLocks/>
+          </p:cNvCxnSpPr>
+          <p:nvPr/>
+        </p:nvCxnSpPr>
+        <p:spPr>
+          <a:xfrm flipH="1">
+            <a:off x="1702938" y="3122123"/>
+            <a:ext cx="301230" cy="0"/>
+          </a:xfrm>
+          <a:prstGeom prst="straightConnector1">
+            <a:avLst/>
+          </a:prstGeom>
+          <a:noFill/>
+          <a:ln w="38100" cap="flat" cmpd="sng" algn="ctr">
+            <a:solidFill>
+              <a:srgbClr val="4472C4"/>
+            </a:solidFill>
+            <a:prstDash val="solid"/>
+            <a:miter lim="800000"/>
+            <a:headEnd type="triangle" w="med" len="med"/>
+            <a:tailEnd type="none" w="med" len="med"/>
+          </a:ln>
+          <a:effectLst/>
+        </p:spPr>
+      </p:cxnSp>
+      <p:sp>
+        <p:nvSpPr>
+          <p:cNvPr id="11" name="TextBox 10">
+            <a:extLst>
+              <a:ext uri="{FF2B5EF4-FFF2-40B4-BE49-F238E27FC236}">
+                <a16:creationId xmlns:a16="http://schemas.microsoft.com/office/drawing/2014/main" id="{02AF5A2A-9EA0-48A0-BCC0-7A1722A28A91}"/>
+              </a:ext>
+            </a:extLst>
+          </p:cNvPr>
+          <p:cNvSpPr txBox="1"/>
+          <p:nvPr/>
+        </p:nvSpPr>
+        <p:spPr>
+          <a:xfrm>
+            <a:off x="43998" y="5578324"/>
+            <a:ext cx="1788286" cy="769441"/>
+          </a:xfrm>
+          <a:prstGeom prst="rect">
+            <a:avLst/>
+          </a:prstGeom>
+          <a:noFill/>
+        </p:spPr>
+        <p:txBody>
+          <a:bodyPr wrap="square" rtlCol="0">
+            <a:spAutoFit/>
+          </a:bodyPr>
+          <a:lstStyle/>
+          <a:p>
+            <a:pPr marL="0" marR="0" lvl="0" indent="0" algn="l" defTabSz="914400" rtl="0" eaLnBrk="1" fontAlgn="auto" latinLnBrk="0" hangingPunct="1">
+              <a:lnSpc>
+                <a:spcPct val="100000"/>
+              </a:lnSpc>
+              <a:spcBef>
+                <a:spcPts val="0"/>
+              </a:spcBef>
+              <a:spcAft>
+                <a:spcPts val="0"/>
+              </a:spcAft>
+              <a:buClrTx/>
+              <a:buSzTx/>
+              <a:buFontTx/>
+              <a:buNone/>
+              <a:tabLst/>
+              <a:defRPr/>
+            </a:pPr>
+            <a:r>
+              <a:rPr kumimoji="0" lang="en-AU" sz="1100" b="0" i="0" u="none" strike="noStrike" kern="1200" cap="none" spc="0" normalizeH="0" baseline="0" noProof="0" dirty="0">
+                <a:ln>
+                  <a:noFill/>
+                </a:ln>
+                <a:solidFill>
+                  <a:srgbClr val="000000"/>
+                </a:solidFill>
+                <a:effectLst/>
+                <a:uLnTx/>
+                <a:uFillTx/>
+                <a:latin typeface="Segoe UI"/>
+                <a:cs typeface="Arial" pitchFamily="34" charset="0"/>
+              </a:rPr>
+              <a:t>Azure Storage Static Website HTML/JavaScript page calls Azure Function HTTP Trigger</a:t>
+            </a:r>
+          </a:p>
+        </p:txBody>
+      </p:sp>
+      <p:sp>
+        <p:nvSpPr>
+          <p:cNvPr id="12" name="TextBox 11">
+            <a:extLst>
+              <a:ext uri="{FF2B5EF4-FFF2-40B4-BE49-F238E27FC236}">
+                <a16:creationId xmlns:a16="http://schemas.microsoft.com/office/drawing/2014/main" id="{236A0B0D-FE8C-430E-B77B-F93696EFB504}"/>
+              </a:ext>
+            </a:extLst>
+          </p:cNvPr>
+          <p:cNvSpPr txBox="1"/>
+          <p:nvPr/>
+        </p:nvSpPr>
+        <p:spPr>
+          <a:xfrm>
+            <a:off x="2061798" y="5578324"/>
+            <a:ext cx="1667100" cy="600164"/>
+          </a:xfrm>
+          <a:prstGeom prst="rect">
+            <a:avLst/>
+          </a:prstGeom>
+          <a:noFill/>
+        </p:spPr>
+        <p:txBody>
+          <a:bodyPr wrap="square" rtlCol="0">
+            <a:spAutoFit/>
+          </a:bodyPr>
+          <a:lstStyle/>
+          <a:p>
+            <a:pPr marL="0" marR="0" lvl="0" indent="0" algn="l" defTabSz="914400" rtl="0" eaLnBrk="1" fontAlgn="auto" latinLnBrk="0" hangingPunct="1">
+              <a:lnSpc>
+                <a:spcPct val="100000"/>
+              </a:lnSpc>
+              <a:spcBef>
+                <a:spcPts val="0"/>
+              </a:spcBef>
+              <a:spcAft>
+                <a:spcPts val="0"/>
+              </a:spcAft>
+              <a:buClrTx/>
+              <a:buSzTx/>
+              <a:buFontTx/>
+              <a:buNone/>
+              <a:tabLst/>
+              <a:defRPr/>
+            </a:pPr>
+            <a:r>
+              <a:rPr kumimoji="0" lang="en-AU" sz="1100" b="0" i="0" u="none" strike="noStrike" kern="1200" cap="none" spc="0" normalizeH="0" baseline="0" noProof="0" dirty="0">
+                <a:ln>
+                  <a:noFill/>
+                </a:ln>
+                <a:solidFill>
+                  <a:srgbClr val="000000"/>
+                </a:solidFill>
+                <a:effectLst/>
+                <a:uLnTx/>
+                <a:uFillTx/>
+                <a:latin typeface="Segoe UI"/>
+                <a:cs typeface="Arial" pitchFamily="34" charset="0"/>
+              </a:rPr>
+              <a:t>Azure Function invokes IoT Central Update Property REST API</a:t>
+            </a:r>
+          </a:p>
+        </p:txBody>
+      </p:sp>
+      <p:sp>
+        <p:nvSpPr>
+          <p:cNvPr id="13" name="TextBox 12">
+            <a:extLst>
+              <a:ext uri="{FF2B5EF4-FFF2-40B4-BE49-F238E27FC236}">
+                <a16:creationId xmlns:a16="http://schemas.microsoft.com/office/drawing/2014/main" id="{E347D9C0-347B-41BA-BD55-080858D94A92}"/>
+              </a:ext>
+            </a:extLst>
+          </p:cNvPr>
+          <p:cNvSpPr txBox="1"/>
+          <p:nvPr/>
+        </p:nvSpPr>
+        <p:spPr>
+          <a:xfrm>
+            <a:off x="3958412" y="5578324"/>
+            <a:ext cx="1667100" cy="938719"/>
+          </a:xfrm>
+          <a:prstGeom prst="rect">
+            <a:avLst/>
+          </a:prstGeom>
+          <a:noFill/>
+        </p:spPr>
+        <p:txBody>
+          <a:bodyPr wrap="square" rtlCol="0">
+            <a:spAutoFit/>
+          </a:bodyPr>
+          <a:lstStyle/>
+          <a:p>
+            <a:pPr marL="0" marR="0" lvl="0" indent="0" algn="l" defTabSz="914400" rtl="0" eaLnBrk="1" fontAlgn="auto" latinLnBrk="0" hangingPunct="1">
+              <a:lnSpc>
+                <a:spcPct val="100000"/>
+              </a:lnSpc>
+              <a:spcBef>
+                <a:spcPts val="0"/>
+              </a:spcBef>
+              <a:spcAft>
+                <a:spcPts val="0"/>
+              </a:spcAft>
+              <a:buClrTx/>
+              <a:buSzTx/>
+              <a:buFontTx/>
+              <a:buNone/>
+              <a:tabLst/>
+              <a:defRPr/>
+            </a:pPr>
+            <a:r>
+              <a:rPr kumimoji="0" lang="en-AU" sz="1100" b="0" i="0" u="none" strike="noStrike" kern="1200" cap="none" spc="0" normalizeH="0" baseline="0" noProof="0" dirty="0">
+                <a:ln>
+                  <a:noFill/>
+                </a:ln>
+                <a:solidFill>
+                  <a:srgbClr val="000000"/>
+                </a:solidFill>
+                <a:effectLst/>
+                <a:uLnTx/>
+                <a:uFillTx/>
+                <a:latin typeface="Segoe UI"/>
+                <a:cs typeface="Arial" pitchFamily="34" charset="0"/>
+              </a:rPr>
+              <a:t>Azure IoT Central requests Azure IoT Hub to send “desired temperature” device twin</a:t>
+            </a:r>
+          </a:p>
+        </p:txBody>
+      </p:sp>
+      <p:sp>
+        <p:nvSpPr>
+          <p:cNvPr id="14" name="TextBox 13">
+            <a:extLst>
+              <a:ext uri="{FF2B5EF4-FFF2-40B4-BE49-F238E27FC236}">
+                <a16:creationId xmlns:a16="http://schemas.microsoft.com/office/drawing/2014/main" id="{9B7B4803-58B2-474D-BDED-9F0A340BB2DC}"/>
+              </a:ext>
+            </a:extLst>
+          </p:cNvPr>
+          <p:cNvSpPr txBox="1"/>
+          <p:nvPr/>
+        </p:nvSpPr>
+        <p:spPr>
+          <a:xfrm>
+            <a:off x="9602484" y="5578324"/>
+            <a:ext cx="1584227" cy="769441"/>
+          </a:xfrm>
+          <a:prstGeom prst="rect">
+            <a:avLst/>
+          </a:prstGeom>
+          <a:noFill/>
+        </p:spPr>
+        <p:txBody>
+          <a:bodyPr wrap="square" rtlCol="0">
+            <a:spAutoFit/>
+          </a:bodyPr>
+          <a:lstStyle/>
+          <a:p>
+            <a:pPr marL="0" marR="0" lvl="0" indent="0" algn="l" defTabSz="914400" rtl="0" eaLnBrk="1" fontAlgn="auto" latinLnBrk="0" hangingPunct="1">
+              <a:lnSpc>
+                <a:spcPct val="100000"/>
+              </a:lnSpc>
+              <a:spcBef>
+                <a:spcPts val="0"/>
+              </a:spcBef>
+              <a:spcAft>
+                <a:spcPts val="0"/>
+              </a:spcAft>
+              <a:buClrTx/>
+              <a:buSzTx/>
+              <a:buFontTx/>
+              <a:buNone/>
+              <a:tabLst/>
+              <a:defRPr/>
+            </a:pPr>
+            <a:r>
+              <a:rPr kumimoji="0" lang="en-AU" sz="1100" b="0" i="0" u="none" strike="noStrike" kern="1200" cap="none" spc="0" normalizeH="0" baseline="0" noProof="0" dirty="0">
+                <a:ln>
+                  <a:noFill/>
+                </a:ln>
+                <a:solidFill>
+                  <a:srgbClr val="000000"/>
+                </a:solidFill>
+                <a:effectLst/>
+                <a:uLnTx/>
+                <a:uFillTx/>
+                <a:latin typeface="Segoe UI"/>
+                <a:cs typeface="Arial" pitchFamily="34" charset="0"/>
+              </a:rPr>
+              <a:t>Azure Sphere implements HVAC actions and reports state</a:t>
+            </a:r>
+          </a:p>
+        </p:txBody>
+      </p:sp>
+      <p:sp>
+        <p:nvSpPr>
+          <p:cNvPr id="16" name="TextBox 15">
+            <a:extLst>
+              <a:ext uri="{FF2B5EF4-FFF2-40B4-BE49-F238E27FC236}">
+                <a16:creationId xmlns:a16="http://schemas.microsoft.com/office/drawing/2014/main" id="{4E86CA0D-9035-4963-A711-706CBE068AA6}"/>
+              </a:ext>
+            </a:extLst>
+          </p:cNvPr>
+          <p:cNvSpPr txBox="1"/>
+          <p:nvPr/>
+        </p:nvSpPr>
+        <p:spPr>
+          <a:xfrm>
+            <a:off x="6096000" y="5578324"/>
+            <a:ext cx="1988321" cy="769441"/>
+          </a:xfrm>
+          <a:prstGeom prst="rect">
+            <a:avLst/>
+          </a:prstGeom>
+          <a:noFill/>
+        </p:spPr>
+        <p:txBody>
+          <a:bodyPr wrap="square" rtlCol="0">
+            <a:spAutoFit/>
+          </a:bodyPr>
+          <a:lstStyle/>
+          <a:p>
+            <a:pPr marL="0" marR="0" lvl="0" indent="0" algn="l" defTabSz="914400" rtl="0" eaLnBrk="1" fontAlgn="auto" latinLnBrk="0" hangingPunct="1">
+              <a:lnSpc>
+                <a:spcPct val="100000"/>
+              </a:lnSpc>
+              <a:spcBef>
+                <a:spcPts val="0"/>
+              </a:spcBef>
+              <a:spcAft>
+                <a:spcPts val="0"/>
+              </a:spcAft>
+              <a:buClrTx/>
+              <a:buSzTx/>
+              <a:buFontTx/>
+              <a:buNone/>
+              <a:tabLst/>
+              <a:defRPr/>
+            </a:pPr>
+            <a:r>
+              <a:rPr kumimoji="0" lang="en-AU" sz="1100" b="0" i="0" u="none" strike="noStrike" kern="1200" cap="none" spc="0" normalizeH="0" baseline="0" noProof="0" dirty="0">
+                <a:ln>
+                  <a:noFill/>
+                </a:ln>
+                <a:solidFill>
+                  <a:srgbClr val="000000"/>
+                </a:solidFill>
+                <a:effectLst/>
+                <a:uLnTx/>
+                <a:uFillTx/>
+                <a:latin typeface="Segoe UI"/>
+                <a:cs typeface="Arial" pitchFamily="34" charset="0"/>
+              </a:rPr>
+              <a:t>Azure IoT Hub updates device twin and sends device twin message to Azure Sphere HVAC control device</a:t>
+            </a:r>
+          </a:p>
+        </p:txBody>
+      </p:sp>
+      <p:pic>
+        <p:nvPicPr>
+          <p:cNvPr id="10" name="Picture 9">
+            <a:extLst>
+              <a:ext uri="{FF2B5EF4-FFF2-40B4-BE49-F238E27FC236}">
+                <a16:creationId xmlns:a16="http://schemas.microsoft.com/office/drawing/2014/main" id="{8C84510C-F2C1-4CF4-ACE1-C9017F523E2B}"/>
+              </a:ext>
+            </a:extLst>
+          </p:cNvPr>
+          <p:cNvPicPr>
+            <a:picLocks noChangeAspect="1"/>
+          </p:cNvPicPr>
+          <p:nvPr/>
+        </p:nvPicPr>
+        <p:blipFill>
+          <a:blip r:embed="rId7"/>
+          <a:stretch>
+            <a:fillRect/>
+          </a:stretch>
+        </p:blipFill>
+        <p:spPr>
+          <a:xfrm>
+            <a:off x="43998" y="2505460"/>
+            <a:ext cx="1001776" cy="820352"/>
+          </a:xfrm>
+          <a:prstGeom prst="rect">
+            <a:avLst/>
+          </a:prstGeom>
+        </p:spPr>
+      </p:pic>
+      <p:pic>
+        <p:nvPicPr>
+          <p:cNvPr id="17" name="Picture 16">
+            <a:extLst>
+              <a:ext uri="{FF2B5EF4-FFF2-40B4-BE49-F238E27FC236}">
+                <a16:creationId xmlns:a16="http://schemas.microsoft.com/office/drawing/2014/main" id="{AAA36A63-4266-4447-877D-89E7DC178A26}"/>
+              </a:ext>
+            </a:extLst>
+          </p:cNvPr>
+          <p:cNvPicPr>
+            <a:picLocks noChangeAspect="1"/>
+          </p:cNvPicPr>
+          <p:nvPr/>
+        </p:nvPicPr>
+        <p:blipFill>
+          <a:blip r:embed="rId8"/>
+          <a:stretch>
+            <a:fillRect/>
+          </a:stretch>
+        </p:blipFill>
+        <p:spPr>
+          <a:xfrm>
+            <a:off x="885003" y="2137912"/>
+            <a:ext cx="850115" cy="1968422"/>
+          </a:xfrm>
+          <a:prstGeom prst="rect">
+            <a:avLst/>
+          </a:prstGeom>
+        </p:spPr>
+      </p:pic>
+      <p:sp>
+        <p:nvSpPr>
+          <p:cNvPr id="49" name="Rectangle 48">
+            <a:extLst>
+              <a:ext uri="{FF2B5EF4-FFF2-40B4-BE49-F238E27FC236}">
+                <a16:creationId xmlns:a16="http://schemas.microsoft.com/office/drawing/2014/main" id="{10265569-4D27-48BE-BF45-A4BD1A6E3101}"/>
+              </a:ext>
+            </a:extLst>
+          </p:cNvPr>
+          <p:cNvSpPr/>
+          <p:nvPr/>
+        </p:nvSpPr>
+        <p:spPr>
+          <a:xfrm>
+            <a:off x="6208495" y="1643136"/>
+            <a:ext cx="1588551" cy="3727062"/>
+          </a:xfrm>
+          <a:prstGeom prst="rect">
+            <a:avLst/>
+          </a:prstGeom>
+          <a:solidFill>
+            <a:schemeClr val="accent1">
+              <a:lumMod val="40000"/>
+              <a:lumOff val="60000"/>
+            </a:schemeClr>
+          </a:solidFill>
+          <a:ln w="12700" cap="flat" cmpd="sng" algn="ctr">
+            <a:solidFill>
+              <a:srgbClr val="4472C4">
+                <a:shade val="50000"/>
+              </a:srgbClr>
+            </a:solidFill>
+            <a:prstDash val="solid"/>
+            <a:miter lim="800000"/>
+          </a:ln>
+          <a:effectLst/>
+        </p:spPr>
+        <p:txBody>
+          <a:bodyPr rtlCol="0" anchor="t"/>
+          <a:lstStyle/>
+          <a:p>
+            <a:pPr marL="0" marR="0" lvl="0" indent="0" algn="ctr" defTabSz="914400" rtl="0" eaLnBrk="1" fontAlgn="auto" latinLnBrk="0" hangingPunct="1">
+              <a:lnSpc>
+                <a:spcPct val="100000"/>
+              </a:lnSpc>
+              <a:spcBef>
+                <a:spcPts val="0"/>
+              </a:spcBef>
+              <a:spcAft>
+                <a:spcPts val="0"/>
+              </a:spcAft>
+              <a:buClrTx/>
+              <a:buSzTx/>
+              <a:buFontTx/>
+              <a:buNone/>
+              <a:tabLst/>
+              <a:defRPr/>
+            </a:pPr>
+            <a:r>
+              <a:rPr kumimoji="0" lang="en-AU" sz="1400" b="0" i="0" u="none" strike="noStrike" kern="0" cap="none" spc="0" normalizeH="0" baseline="0" noProof="0" dirty="0">
+                <a:ln>
+                  <a:noFill/>
+                </a:ln>
+                <a:solidFill>
+                  <a:prstClr val="black"/>
+                </a:solidFill>
+                <a:effectLst/>
+                <a:uLnTx/>
+                <a:uFillTx/>
+                <a:latin typeface="Calibri" panose="020F0502020204030204" pitchFamily="34" charset="0"/>
+                <a:ea typeface="Verdana" panose="020B0604030504040204" pitchFamily="34" charset="0"/>
+                <a:cs typeface="Calibri" panose="020F0502020204030204" pitchFamily="34" charset="0"/>
+              </a:rPr>
+              <a:t>Azure IoT Hub</a:t>
+            </a:r>
+          </a:p>
+        </p:txBody>
+      </p:sp>
+      <p:sp>
+        <p:nvSpPr>
+          <p:cNvPr id="50" name="Rectangle 49">
+            <a:extLst>
+              <a:ext uri="{FF2B5EF4-FFF2-40B4-BE49-F238E27FC236}">
+                <a16:creationId xmlns:a16="http://schemas.microsoft.com/office/drawing/2014/main" id="{CE883925-FFB7-473D-8D3B-8384F0B91A4F}"/>
+              </a:ext>
+            </a:extLst>
+          </p:cNvPr>
+          <p:cNvSpPr/>
+          <p:nvPr/>
+        </p:nvSpPr>
+        <p:spPr>
+          <a:xfrm>
+            <a:off x="6376666" y="2662695"/>
+            <a:ext cx="1295349" cy="1153356"/>
+          </a:xfrm>
+          <a:prstGeom prst="rect">
+            <a:avLst/>
+          </a:prstGeom>
+          <a:solidFill>
+            <a:srgbClr val="FFD44B"/>
+          </a:solidFill>
+          <a:ln w="12700" cap="flat" cmpd="sng" algn="ctr">
+            <a:solidFill>
+              <a:srgbClr val="4472C4">
+                <a:shade val="50000"/>
+              </a:srgbClr>
+            </a:solidFill>
+            <a:prstDash val="solid"/>
+            <a:miter lim="800000"/>
+          </a:ln>
+          <a:effectLst/>
+        </p:spPr>
+        <p:txBody>
+          <a:bodyPr rtlCol="0" anchor="t"/>
+          <a:lstStyle/>
+          <a:p>
+            <a:pPr marL="0" marR="0" lvl="0" indent="0" algn="ctr" defTabSz="914400" rtl="0" eaLnBrk="1" fontAlgn="auto" latinLnBrk="0" hangingPunct="1">
+              <a:lnSpc>
+                <a:spcPct val="100000"/>
+              </a:lnSpc>
+              <a:spcBef>
+                <a:spcPts val="0"/>
+              </a:spcBef>
+              <a:spcAft>
+                <a:spcPts val="0"/>
+              </a:spcAft>
+              <a:buClrTx/>
+              <a:buSzTx/>
+              <a:buFontTx/>
+              <a:buNone/>
+              <a:tabLst/>
+              <a:defRPr/>
+            </a:pPr>
+            <a:r>
+              <a:rPr kumimoji="0" lang="en-AU" sz="1100" b="0" i="0" u="none" strike="noStrike" kern="0" cap="none" spc="0" normalizeH="0" baseline="0" noProof="0" dirty="0">
+                <a:ln>
+                  <a:noFill/>
+                </a:ln>
+                <a:solidFill>
+                  <a:srgbClr val="000000"/>
+                </a:solidFill>
+                <a:effectLst/>
+                <a:uLnTx/>
+                <a:uFillTx/>
+                <a:latin typeface="Calibri" panose="020F0502020204030204" pitchFamily="34" charset="0"/>
+                <a:ea typeface="Verdana" panose="020B0604030504040204" pitchFamily="34" charset="0"/>
+                <a:cs typeface="Calibri" panose="020F0502020204030204" pitchFamily="34" charset="0"/>
+              </a:rPr>
+              <a:t>IoT Hub Messaging</a:t>
+            </a:r>
+          </a:p>
+        </p:txBody>
+      </p:sp>
+      <p:sp>
+        <p:nvSpPr>
+          <p:cNvPr id="51" name="Rectangle 50">
+            <a:extLst>
+              <a:ext uri="{FF2B5EF4-FFF2-40B4-BE49-F238E27FC236}">
+                <a16:creationId xmlns:a16="http://schemas.microsoft.com/office/drawing/2014/main" id="{6EA3341B-830F-4631-AE31-44217C60AB13}"/>
+              </a:ext>
+            </a:extLst>
+          </p:cNvPr>
+          <p:cNvSpPr/>
+          <p:nvPr/>
+        </p:nvSpPr>
+        <p:spPr>
+          <a:xfrm>
+            <a:off x="6359799" y="4048351"/>
+            <a:ext cx="1295349" cy="936003"/>
+          </a:xfrm>
+          <a:prstGeom prst="rect">
+            <a:avLst/>
+          </a:prstGeom>
+          <a:solidFill>
+            <a:srgbClr val="FFD44B"/>
+          </a:solidFill>
+          <a:ln w="12700" cap="flat" cmpd="sng" algn="ctr">
+            <a:solidFill>
+              <a:srgbClr val="4472C4">
+                <a:shade val="50000"/>
+              </a:srgbClr>
+            </a:solidFill>
+            <a:prstDash val="solid"/>
+            <a:miter lim="800000"/>
+          </a:ln>
+          <a:effectLst/>
+        </p:spPr>
+        <p:txBody>
+          <a:bodyPr rtlCol="0" anchor="t"/>
+          <a:lstStyle/>
+          <a:p>
+            <a:pPr marL="0" marR="0" lvl="0" indent="0" algn="ctr" defTabSz="914400" rtl="0" eaLnBrk="1" fontAlgn="auto" latinLnBrk="0" hangingPunct="1">
+              <a:lnSpc>
+                <a:spcPct val="100000"/>
+              </a:lnSpc>
+              <a:spcBef>
+                <a:spcPts val="0"/>
+              </a:spcBef>
+              <a:spcAft>
+                <a:spcPts val="0"/>
+              </a:spcAft>
+              <a:buClrTx/>
+              <a:buSzTx/>
+              <a:buFontTx/>
+              <a:buNone/>
+              <a:tabLst/>
+              <a:defRPr/>
+            </a:pPr>
+            <a:r>
+              <a:rPr kumimoji="0" lang="en-AU" sz="1100" b="0" i="0" u="none" strike="noStrike" kern="0" cap="none" spc="0" normalizeH="0" baseline="0" noProof="0" dirty="0">
+                <a:ln>
+                  <a:noFill/>
+                </a:ln>
+                <a:solidFill>
+                  <a:srgbClr val="000000"/>
+                </a:solidFill>
+                <a:effectLst/>
+                <a:uLnTx/>
+                <a:uFillTx/>
+                <a:latin typeface="Calibri" panose="020F0502020204030204" pitchFamily="34" charset="0"/>
+                <a:ea typeface="Verdana" panose="020B0604030504040204" pitchFamily="34" charset="0"/>
+                <a:cs typeface="Calibri" panose="020F0502020204030204" pitchFamily="34" charset="0"/>
+              </a:rPr>
+              <a:t>Device twin</a:t>
+            </a:r>
+          </a:p>
+          <a:p>
+            <a:pPr marL="0" marR="0" lvl="0" indent="0" algn="ctr" defTabSz="914400" rtl="0" eaLnBrk="1" fontAlgn="auto" latinLnBrk="0" hangingPunct="1">
+              <a:lnSpc>
+                <a:spcPct val="100000"/>
+              </a:lnSpc>
+              <a:spcBef>
+                <a:spcPts val="0"/>
+              </a:spcBef>
+              <a:spcAft>
+                <a:spcPts val="0"/>
+              </a:spcAft>
+              <a:buClrTx/>
+              <a:buSzTx/>
+              <a:buFontTx/>
+              <a:buNone/>
+              <a:tabLst/>
+              <a:defRPr/>
+            </a:pPr>
+            <a:r>
+              <a:rPr lang="en-AU" sz="1100" kern="0" dirty="0">
+                <a:solidFill>
+                  <a:srgbClr val="000000"/>
+                </a:solidFill>
+                <a:latin typeface="Calibri" panose="020F0502020204030204" pitchFamily="34" charset="0"/>
+                <a:ea typeface="Verdana" panose="020B0604030504040204" pitchFamily="34" charset="0"/>
+                <a:cs typeface="Calibri" panose="020F0502020204030204" pitchFamily="34" charset="0"/>
+              </a:rPr>
+              <a:t>Desired Temperature</a:t>
+            </a:r>
+            <a:endParaRPr kumimoji="0" lang="en-AU" sz="1100" b="0" i="0" u="none" strike="noStrike" kern="0" cap="none" spc="0" normalizeH="0" baseline="0" noProof="0" dirty="0">
+              <a:ln>
+                <a:noFill/>
+              </a:ln>
+              <a:solidFill>
+                <a:srgbClr val="000000"/>
+              </a:solidFill>
+              <a:effectLst/>
+              <a:uLnTx/>
+              <a:uFillTx/>
+              <a:latin typeface="Calibri" panose="020F0502020204030204" pitchFamily="34" charset="0"/>
+              <a:ea typeface="Verdana" panose="020B0604030504040204" pitchFamily="34" charset="0"/>
+              <a:cs typeface="Calibri" panose="020F0502020204030204" pitchFamily="34" charset="0"/>
+            </a:endParaRPr>
+          </a:p>
+        </p:txBody>
+      </p:sp>
+      <p:sp>
+        <p:nvSpPr>
+          <p:cNvPr id="52" name="TextBox 51">
+            <a:extLst>
+              <a:ext uri="{FF2B5EF4-FFF2-40B4-BE49-F238E27FC236}">
+                <a16:creationId xmlns:a16="http://schemas.microsoft.com/office/drawing/2014/main" id="{6CE79B01-F26D-447C-BC56-91F5DA6EBC5A}"/>
+              </a:ext>
+            </a:extLst>
+          </p:cNvPr>
+          <p:cNvSpPr txBox="1"/>
+          <p:nvPr/>
+        </p:nvSpPr>
+        <p:spPr>
+          <a:xfrm>
+            <a:off x="6555439" y="4652285"/>
+            <a:ext cx="937802" cy="261610"/>
+          </a:xfrm>
+          <a:prstGeom prst="rect">
+            <a:avLst/>
+          </a:prstGeom>
+          <a:solidFill>
+            <a:srgbClr val="5B9BD5">
+              <a:lumMod val="75000"/>
+            </a:srgbClr>
+          </a:solidFill>
+        </p:spPr>
+        <p:txBody>
+          <a:bodyPr wrap="square" rtlCol="0">
+            <a:spAutoFit/>
+          </a:bodyPr>
+          <a:lstStyle/>
+          <a:p>
+            <a:pPr marL="0" marR="0" lvl="0" indent="0" algn="ctr" defTabSz="914400" rtl="0" eaLnBrk="1" fontAlgn="auto" latinLnBrk="0" hangingPunct="1">
+              <a:lnSpc>
+                <a:spcPct val="100000"/>
+              </a:lnSpc>
+              <a:spcBef>
+                <a:spcPts val="0"/>
+              </a:spcBef>
+              <a:spcAft>
+                <a:spcPts val="0"/>
+              </a:spcAft>
+              <a:buClrTx/>
+              <a:buSzTx/>
+              <a:buFontTx/>
+              <a:buNone/>
+              <a:tabLst/>
+              <a:defRPr/>
+            </a:pPr>
+            <a:r>
+              <a:rPr kumimoji="0" lang="en-AU" sz="1100" b="0" i="0" u="none" strike="noStrike" kern="0" cap="none" spc="0" normalizeH="0" baseline="0" noProof="0" dirty="0">
+                <a:ln>
+                  <a:noFill/>
+                </a:ln>
+                <a:solidFill>
+                  <a:prstClr val="white"/>
+                </a:solidFill>
+                <a:effectLst/>
+                <a:uLnTx/>
+                <a:uFillTx/>
+                <a:latin typeface="Calibri" panose="020F0502020204030204" pitchFamily="34" charset="0"/>
+                <a:cs typeface="Calibri" panose="020F0502020204030204" pitchFamily="34" charset="0"/>
+              </a:rPr>
+              <a:t>JSON</a:t>
+            </a:r>
+          </a:p>
+        </p:txBody>
+      </p:sp>
+      <p:pic>
+        <p:nvPicPr>
+          <p:cNvPr id="66" name="Picture 65">
+            <a:extLst>
+              <a:ext uri="{FF2B5EF4-FFF2-40B4-BE49-F238E27FC236}">
+                <a16:creationId xmlns:a16="http://schemas.microsoft.com/office/drawing/2014/main" id="{F499BA48-D431-4088-8D84-5C39CF73E6BA}"/>
+              </a:ext>
+            </a:extLst>
+          </p:cNvPr>
+          <p:cNvPicPr>
+            <a:picLocks noChangeAspect="1"/>
+          </p:cNvPicPr>
+          <p:nvPr/>
+        </p:nvPicPr>
+        <p:blipFill>
+          <a:blip r:embed="rId9">
+            <a:extLst>
+              <a:ext uri="{BEBA8EAE-BF5A-486C-A8C5-ECC9F3942E4B}">
+                <a14:imgProps xmlns:a14="http://schemas.microsoft.com/office/drawing/2010/main">
+                  <a14:imgLayer r:embed="rId10">
+                    <a14:imgEffect>
+                      <a14:backgroundRemoval t="6522" b="93478" l="7500" r="92500">
+                        <a14:foregroundMark x1="41250" y1="82609" x2="41250" y2="82609"/>
+                        <a14:foregroundMark x1="42500" y1="89130" x2="41250" y2="92391"/>
+                        <a14:foregroundMark x1="32000" y1="89130" x2="40000" y2="93478"/>
+                        <a14:foregroundMark x1="30000" y1="88043" x2="32000" y2="89130"/>
+                        <a14:foregroundMark x1="82500" y1="81522" x2="86250" y2="81522"/>
+                        <a14:foregroundMark x1="78750" y1="52174" x2="80000" y2="48913"/>
+                        <a14:foregroundMark x1="92500" y1="21739" x2="92500" y2="18478"/>
+                        <a14:foregroundMark x1="57500" y1="7609" x2="8750" y2="42391"/>
+                        <a14:foregroundMark x1="8750" y1="42391" x2="7500" y2="66304"/>
+                        <a14:foregroundMark x1="7500" y1="7609" x2="56250" y2="6522"/>
+                        <a14:foregroundMark x1="82082" y1="86957" x2="78750" y2="89130"/>
+                        <a14:foregroundMark x1="83749" y1="85870" x2="82082" y2="86957"/>
+                        <a14:foregroundMark x1="88750" y1="82609" x2="86142" y2="84310"/>
+                        <a14:foregroundMark x1="88751" y1="89130" x2="92500" y2="86957"/>
+                        <a14:foregroundMark x1="86876" y1="90217" x2="88751" y2="89130"/>
+                        <a14:foregroundMark x1="81250" y1="93478" x2="86876" y2="90217"/>
+                        <a14:foregroundMark x1="88750" y1="91304" x2="88750" y2="91304"/>
+                        <a14:foregroundMark x1="90000" y1="90217" x2="88750" y2="92391"/>
+                        <a14:backgroundMark x1="37500" y1="88043" x2="37500" y2="88043"/>
+                        <a14:backgroundMark x1="36250" y1="89130" x2="36250" y2="89130"/>
+                        <a14:backgroundMark x1="33750" y1="89130" x2="33750" y2="89130"/>
+                        <a14:backgroundMark x1="85000" y1="86957" x2="85000" y2="86957"/>
+                        <a14:backgroundMark x1="86250" y1="85870" x2="86250" y2="85870"/>
+                        <a14:backgroundMark x1="85000" y1="85870" x2="86250" y2="86957"/>
+                        <a14:backgroundMark x1="83750" y1="86957" x2="83750" y2="86957"/>
+                        <a14:backgroundMark x1="83750" y1="85870" x2="85000" y2="85870"/>
+                        <a14:backgroundMark x1="85000" y1="84783" x2="85000" y2="84783"/>
+                        <a14:backgroundMark x1="82500" y1="86957" x2="82500" y2="86957"/>
+                        <a14:backgroundMark x1="86250" y1="89130" x2="86250" y2="89130"/>
+                        <a14:backgroundMark x1="85000" y1="90217" x2="85000" y2="90217"/>
+                      </a14:backgroundRemoval>
+                    </a14:imgEffect>
+                  </a14:imgLayer>
+                </a14:imgProps>
+              </a:ext>
+            </a:extLst>
+          </a:blip>
+          <a:stretch>
+            <a:fillRect/>
+          </a:stretch>
+        </p:blipFill>
+        <p:spPr>
+          <a:xfrm>
+            <a:off x="6616991" y="546231"/>
+            <a:ext cx="761908" cy="876194"/>
+          </a:xfrm>
+          <a:prstGeom prst="rect">
+            <a:avLst/>
+          </a:prstGeom>
+          <a:effectLst>
+            <a:outerShdw blurRad="50800" dist="38100" dir="2700000" algn="tl" rotWithShape="0">
+              <a:prstClr val="black">
+                <a:alpha val="40000"/>
+              </a:prstClr>
+            </a:outerShdw>
+          </a:effectLst>
+        </p:spPr>
+      </p:pic>
+      <p:sp>
+        <p:nvSpPr>
+          <p:cNvPr id="67" name="Rectangle 66">
+            <a:extLst>
+              <a:ext uri="{FF2B5EF4-FFF2-40B4-BE49-F238E27FC236}">
+                <a16:creationId xmlns:a16="http://schemas.microsoft.com/office/drawing/2014/main" id="{43BDE44E-03F2-4F75-BA76-37C97A2B3BF8}"/>
+              </a:ext>
+            </a:extLst>
+          </p:cNvPr>
+          <p:cNvSpPr/>
+          <p:nvPr/>
+        </p:nvSpPr>
+        <p:spPr>
+          <a:xfrm>
+            <a:off x="8397495" y="1643136"/>
+            <a:ext cx="3710725" cy="3727062"/>
+          </a:xfrm>
+          <a:prstGeom prst="rect">
+            <a:avLst/>
+          </a:prstGeom>
+          <a:solidFill>
+            <a:schemeClr val="accent1">
+              <a:lumMod val="20000"/>
+              <a:lumOff val="80000"/>
+            </a:schemeClr>
+          </a:solidFill>
+          <a:ln w="12700" cap="flat" cmpd="sng" algn="ctr">
+            <a:solidFill>
+              <a:srgbClr val="4472C4">
+                <a:shade val="50000"/>
+              </a:srgbClr>
+            </a:solidFill>
+            <a:prstDash val="solid"/>
+            <a:miter lim="800000"/>
+          </a:ln>
+          <a:effectLst/>
+        </p:spPr>
+        <p:txBody>
+          <a:bodyPr rtlCol="0" anchor="t"/>
+          <a:lstStyle/>
+          <a:p>
+            <a:pPr marL="0" marR="0" lvl="0" indent="0" algn="ctr" defTabSz="914400" rtl="0" eaLnBrk="1" fontAlgn="auto" latinLnBrk="0" hangingPunct="1">
+              <a:lnSpc>
+                <a:spcPct val="100000"/>
+              </a:lnSpc>
+              <a:spcBef>
+                <a:spcPts val="0"/>
+              </a:spcBef>
+              <a:spcAft>
+                <a:spcPts val="0"/>
+              </a:spcAft>
+              <a:buClrTx/>
+              <a:buSzTx/>
+              <a:buFontTx/>
+              <a:buNone/>
+              <a:tabLst/>
+              <a:defRPr/>
+            </a:pPr>
+            <a:r>
+              <a:rPr kumimoji="0" lang="en-AU" sz="1400" b="0" i="0" u="none" strike="noStrike" kern="0" cap="none" spc="0" normalizeH="0" baseline="0" noProof="0" dirty="0">
+                <a:ln>
+                  <a:noFill/>
+                </a:ln>
+                <a:solidFill>
+                  <a:prstClr val="black"/>
+                </a:solidFill>
+                <a:effectLst/>
+                <a:uLnTx/>
+                <a:uFillTx/>
+                <a:latin typeface="Calibri" panose="020F0502020204030204" pitchFamily="34" charset="0"/>
+                <a:ea typeface="Verdana" panose="020B0604030504040204" pitchFamily="34" charset="0"/>
+                <a:cs typeface="Calibri" panose="020F0502020204030204" pitchFamily="34" charset="0"/>
+              </a:rPr>
+              <a:t>Azure Sphere</a:t>
+            </a:r>
+          </a:p>
+        </p:txBody>
+      </p:sp>
+      <p:sp>
+        <p:nvSpPr>
+          <p:cNvPr id="77" name="Rectangle 76">
+            <a:extLst>
+              <a:ext uri="{FF2B5EF4-FFF2-40B4-BE49-F238E27FC236}">
+                <a16:creationId xmlns:a16="http://schemas.microsoft.com/office/drawing/2014/main" id="{7B0B4C19-B6B5-4C6F-8FE0-62F902B7ECFD}"/>
+              </a:ext>
+            </a:extLst>
+          </p:cNvPr>
+          <p:cNvSpPr/>
+          <p:nvPr/>
+        </p:nvSpPr>
+        <p:spPr bwMode="auto">
+          <a:xfrm>
+            <a:off x="8470146" y="1915209"/>
+            <a:ext cx="1227854" cy="3383290"/>
+          </a:xfrm>
+          <a:prstGeom prst="rect">
+            <a:avLst/>
+          </a:prstGeom>
+          <a:solidFill>
+            <a:srgbClr val="008AF2"/>
+          </a:solidFill>
+          <a:ln>
+            <a:noFill/>
+            <a:headEnd type="none" w="med" len="med"/>
+            <a:tailEnd type="none" w="med" len="med"/>
+          </a:ln>
+          <a:effectLst/>
+        </p:spPr>
+        <p:style>
+          <a:lnRef idx="1">
+            <a:schemeClr val="accent2"/>
+          </a:lnRef>
+          <a:fillRef idx="3">
+            <a:schemeClr val="accent2"/>
+          </a:fillRef>
+          <a:effectRef idx="2">
+            <a:schemeClr val="accent2"/>
+          </a:effectRef>
+          <a:fontRef idx="minor">
+            <a:schemeClr val="lt1"/>
+          </a:fontRef>
+        </p:style>
+        <p:txBody>
+          <a:bodyPr rot="0" spcFirstLastPara="0" vertOverflow="overflow" horzOverflow="overflow" vert="horz" wrap="square" lIns="182880" tIns="146304" rIns="182880" bIns="146304" numCol="1" spcCol="0" rtlCol="0" fromWordArt="0" anchor="t" anchorCtr="0" forceAA="0" compatLnSpc="1">
+            <a:prstTxWarp prst="textNoShape">
+              <a:avLst/>
+            </a:prstTxWarp>
+            <a:noAutofit/>
+          </a:bodyPr>
+          <a:lstStyle/>
+          <a:p>
+            <a:pPr algn="ctr" defTabSz="932472" fontAlgn="base">
+              <a:spcBef>
+                <a:spcPct val="0"/>
+              </a:spcBef>
+              <a:spcAft>
+                <a:spcPct val="0"/>
+              </a:spcAft>
+            </a:pPr>
+            <a:r>
+              <a:rPr lang="en-AU" sz="1600" dirty="0">
+                <a:solidFill>
+                  <a:schemeClr val="bg1"/>
+                </a:solidFill>
+                <a:latin typeface="Calibri" panose="020F0502020204030204" pitchFamily="34" charset="0"/>
+                <a:ea typeface="Segoe UI" pitchFamily="34" charset="0"/>
+                <a:cs typeface="Calibri" panose="020F0502020204030204" pitchFamily="34" charset="0"/>
+              </a:rPr>
+              <a:t>Cortex A7 High-level</a:t>
+            </a:r>
+          </a:p>
+        </p:txBody>
+      </p:sp>
+      <p:pic>
+        <p:nvPicPr>
+          <p:cNvPr id="78" name="Picture 77">
+            <a:extLst>
+              <a:ext uri="{FF2B5EF4-FFF2-40B4-BE49-F238E27FC236}">
+                <a16:creationId xmlns:a16="http://schemas.microsoft.com/office/drawing/2014/main" id="{9C7EB782-DF61-42EC-A58C-2CF92DE9F55C}"/>
+              </a:ext>
+            </a:extLst>
+          </p:cNvPr>
+          <p:cNvPicPr>
+            <a:picLocks noChangeAspect="1" noChangeArrowheads="1"/>
+          </p:cNvPicPr>
+          <p:nvPr/>
+        </p:nvPicPr>
+        <p:blipFill>
+          <a:blip r:embed="rId11" cstate="print">
+            <a:extLst>
+              <a:ext uri="{28A0092B-C50C-407E-A947-70E740481C1C}">
+                <a14:useLocalDpi xmlns:a14="http://schemas.microsoft.com/office/drawing/2010/main" val="0"/>
+              </a:ext>
+            </a:extLst>
+          </a:blip>
+          <a:srcRect/>
+          <a:stretch>
+            <a:fillRect/>
+          </a:stretch>
+        </p:blipFill>
+        <p:spPr bwMode="auto">
+          <a:xfrm>
+            <a:off x="9357125" y="526311"/>
+            <a:ext cx="1641805" cy="916033"/>
+          </a:xfrm>
+          <a:prstGeom prst="rect">
+            <a:avLst/>
+          </a:prstGeom>
+          <a:noFill/>
+          <a:extLst>
+            <a:ext uri="{909E8E84-426E-40DD-AFC4-6F175D3DCCD1}">
+              <a14:hiddenFill xmlns:a14="http://schemas.microsoft.com/office/drawing/2010/main">
+                <a:solidFill>
+                  <a:srgbClr val="FFFFFF"/>
+                </a:solidFill>
+              </a14:hiddenFill>
+            </a:ext>
+          </a:extLst>
+        </p:spPr>
+      </p:pic>
+      <p:sp>
+        <p:nvSpPr>
+          <p:cNvPr id="79" name="Rectangle 78">
+            <a:extLst>
+              <a:ext uri="{FF2B5EF4-FFF2-40B4-BE49-F238E27FC236}">
+                <a16:creationId xmlns:a16="http://schemas.microsoft.com/office/drawing/2014/main" id="{25711B0C-140A-4F2B-BC9F-FE3458BE98EF}"/>
+              </a:ext>
+            </a:extLst>
+          </p:cNvPr>
+          <p:cNvSpPr/>
+          <p:nvPr/>
+        </p:nvSpPr>
+        <p:spPr>
+          <a:xfrm>
+            <a:off x="4026174" y="1643136"/>
+            <a:ext cx="1584817" cy="3727062"/>
+          </a:xfrm>
+          <a:prstGeom prst="rect">
+            <a:avLst/>
+          </a:prstGeom>
+          <a:solidFill>
+            <a:schemeClr val="accent1">
+              <a:lumMod val="60000"/>
+              <a:lumOff val="40000"/>
+            </a:schemeClr>
+          </a:solidFill>
+          <a:ln w="12700" cap="flat" cmpd="sng" algn="ctr">
+            <a:solidFill>
+              <a:srgbClr val="4472C4">
+                <a:shade val="50000"/>
+              </a:srgbClr>
+            </a:solidFill>
+            <a:prstDash val="solid"/>
+            <a:miter lim="800000"/>
+          </a:ln>
+          <a:effectLst/>
+        </p:spPr>
+        <p:txBody>
+          <a:bodyPr rtlCol="0" anchor="t"/>
+          <a:lstStyle/>
+          <a:p>
+            <a:pPr marL="0" marR="0" lvl="0" indent="0" algn="ctr" defTabSz="914400" rtl="0" eaLnBrk="1" fontAlgn="auto" latinLnBrk="0" hangingPunct="1">
+              <a:lnSpc>
+                <a:spcPct val="100000"/>
+              </a:lnSpc>
+              <a:spcBef>
+                <a:spcPts val="0"/>
+              </a:spcBef>
+              <a:spcAft>
+                <a:spcPts val="0"/>
+              </a:spcAft>
+              <a:buClrTx/>
+              <a:buSzTx/>
+              <a:buFontTx/>
+              <a:buNone/>
+              <a:tabLst/>
+              <a:defRPr/>
+            </a:pPr>
+            <a:r>
+              <a:rPr kumimoji="0" lang="en-AU" sz="1400" b="0" i="0" u="none" strike="noStrike" kern="0" cap="none" spc="0" normalizeH="0" baseline="0" noProof="0" dirty="0">
+                <a:ln>
+                  <a:noFill/>
+                </a:ln>
+                <a:solidFill>
+                  <a:prstClr val="black"/>
+                </a:solidFill>
+                <a:effectLst/>
+                <a:uLnTx/>
+                <a:uFillTx/>
+                <a:latin typeface="Calibri" panose="020F0502020204030204" pitchFamily="34" charset="0"/>
+                <a:ea typeface="Verdana" panose="020B0604030504040204" pitchFamily="34" charset="0"/>
+                <a:cs typeface="Calibri" panose="020F0502020204030204" pitchFamily="34" charset="0"/>
+              </a:rPr>
+              <a:t>Azure IoT Central</a:t>
+            </a:r>
+          </a:p>
+        </p:txBody>
+      </p:sp>
+      <p:sp>
+        <p:nvSpPr>
+          <p:cNvPr id="80" name="Rectangle 79">
+            <a:extLst>
+              <a:ext uri="{FF2B5EF4-FFF2-40B4-BE49-F238E27FC236}">
+                <a16:creationId xmlns:a16="http://schemas.microsoft.com/office/drawing/2014/main" id="{5C1BDD13-7B31-4850-978A-FBEB6DF4672B}"/>
+              </a:ext>
+            </a:extLst>
+          </p:cNvPr>
+          <p:cNvSpPr/>
+          <p:nvPr/>
+        </p:nvSpPr>
+        <p:spPr>
+          <a:xfrm>
+            <a:off x="4197258" y="2313311"/>
+            <a:ext cx="1242647" cy="2600584"/>
+          </a:xfrm>
+          <a:prstGeom prst="rect">
+            <a:avLst/>
+          </a:prstGeom>
+          <a:solidFill>
+            <a:srgbClr val="FFD44B"/>
+          </a:solidFill>
+          <a:ln w="12700" cap="flat" cmpd="sng" algn="ctr">
+            <a:solidFill>
+              <a:srgbClr val="4472C4">
+                <a:shade val="50000"/>
+              </a:srgbClr>
+            </a:solidFill>
+            <a:prstDash val="solid"/>
+            <a:miter lim="800000"/>
+          </a:ln>
+          <a:effectLst/>
+        </p:spPr>
+        <p:txBody>
+          <a:bodyPr rtlCol="0" anchor="ctr"/>
+          <a:lstStyle/>
+          <a:p>
+            <a:pPr marL="0" marR="0" lvl="0" indent="0" algn="ctr" defTabSz="914400" rtl="0" eaLnBrk="1" fontAlgn="auto" latinLnBrk="0" hangingPunct="1">
+              <a:lnSpc>
+                <a:spcPct val="100000"/>
+              </a:lnSpc>
+              <a:spcBef>
+                <a:spcPts val="0"/>
+              </a:spcBef>
+              <a:spcAft>
+                <a:spcPts val="0"/>
+              </a:spcAft>
+              <a:buClrTx/>
+              <a:buSzTx/>
+              <a:buFontTx/>
+              <a:buNone/>
+              <a:tabLst/>
+              <a:defRPr/>
+            </a:pPr>
+            <a:endParaRPr kumimoji="0" lang="en-AU" sz="1100" b="0" i="0" u="none" strike="noStrike" kern="0" cap="none" spc="0" normalizeH="0" baseline="0" noProof="0" dirty="0">
+              <a:ln>
+                <a:noFill/>
+              </a:ln>
+              <a:solidFill>
+                <a:prstClr val="black"/>
+              </a:solidFill>
+              <a:effectLst/>
+              <a:uLnTx/>
+              <a:uFillTx/>
+              <a:latin typeface="Calibri" panose="020F0502020204030204" pitchFamily="34" charset="0"/>
+              <a:ea typeface="Verdana" panose="020B0604030504040204" pitchFamily="34" charset="0"/>
+              <a:cs typeface="Calibri" panose="020F0502020204030204" pitchFamily="34" charset="0"/>
+            </a:endParaRPr>
+          </a:p>
+        </p:txBody>
+      </p:sp>
+      <p:pic>
+        <p:nvPicPr>
+          <p:cNvPr id="81" name="Picture 2" descr="See the source image">
+            <a:extLst>
+              <a:ext uri="{FF2B5EF4-FFF2-40B4-BE49-F238E27FC236}">
+                <a16:creationId xmlns:a16="http://schemas.microsoft.com/office/drawing/2014/main" id="{B6152EC1-E7B0-44A7-B863-C6F3A9BC46E6}"/>
+              </a:ext>
+            </a:extLst>
+          </p:cNvPr>
+          <p:cNvPicPr>
+            <a:picLocks noChangeAspect="1" noChangeArrowheads="1"/>
+          </p:cNvPicPr>
+          <p:nvPr/>
+        </p:nvPicPr>
+        <p:blipFill>
+          <a:blip r:embed="rId12" cstate="print">
+            <a:extLst>
+              <a:ext uri="{BEBA8EAE-BF5A-486C-A8C5-ECC9F3942E4B}">
+                <a14:imgProps xmlns:a14="http://schemas.microsoft.com/office/drawing/2010/main">
+                  <a14:imgLayer r:embed="rId13">
+                    <a14:imgEffect>
+                      <a14:backgroundRemoval t="3125" b="96307" l="3797" r="94304">
+                        <a14:foregroundMark x1="28797" y1="16761" x2="28797" y2="16761"/>
+                        <a14:foregroundMark x1="6646" y1="35227" x2="6646" y2="35227"/>
+                        <a14:foregroundMark x1="51266" y1="4545" x2="51266" y2="4545"/>
+                        <a14:foregroundMark x1="94620" y1="41761" x2="94620" y2="41761"/>
+                        <a14:foregroundMark x1="48418" y1="96307" x2="48418" y2="96307"/>
+                        <a14:foregroundMark x1="4747" y1="70170" x2="4747" y2="70170"/>
+                        <a14:foregroundMark x1="4114" y1="34091" x2="4114" y2="34091"/>
+                        <a14:foregroundMark x1="3797" y1="68182" x2="3797" y2="68182"/>
+                        <a14:foregroundMark x1="53797" y1="49432" x2="53797" y2="49432"/>
+                      </a14:backgroundRemoval>
+                    </a14:imgEffect>
+                  </a14:imgLayer>
+                </a14:imgProps>
+              </a:ext>
+              <a:ext uri="{28A0092B-C50C-407E-A947-70E740481C1C}">
+                <a14:useLocalDpi xmlns:a14="http://schemas.microsoft.com/office/drawing/2010/main" val="0"/>
+              </a:ext>
+            </a:extLst>
+          </a:blip>
+          <a:srcRect/>
+          <a:stretch>
+            <a:fillRect/>
+          </a:stretch>
+        </p:blipFill>
+        <p:spPr bwMode="auto">
+          <a:xfrm>
+            <a:off x="4399598" y="517613"/>
+            <a:ext cx="837966" cy="933430"/>
+          </a:xfrm>
+          <a:prstGeom prst="rect">
+            <a:avLst/>
+          </a:prstGeom>
+          <a:noFill/>
+          <a:effectLst>
+            <a:outerShdw blurRad="50800" dist="38100" dir="2700000" algn="tl" rotWithShape="0">
+              <a:prstClr val="black">
+                <a:alpha val="40000"/>
+              </a:prstClr>
+            </a:outerShdw>
+          </a:effectLst>
+          <a:extLst>
+            <a:ext uri="{909E8E84-426E-40DD-AFC4-6F175D3DCCD1}">
+              <a14:hiddenFill xmlns:a14="http://schemas.microsoft.com/office/drawing/2010/main">
+                <a:solidFill>
+                  <a:srgbClr val="FFFFFF"/>
+                </a:solidFill>
+              </a14:hiddenFill>
+            </a:ext>
+          </a:extLst>
+        </p:spPr>
+      </p:pic>
+      <p:sp>
+        <p:nvSpPr>
+          <p:cNvPr id="82" name="Oval 81">
+            <a:extLst>
+              <a:ext uri="{FF2B5EF4-FFF2-40B4-BE49-F238E27FC236}">
+                <a16:creationId xmlns:a16="http://schemas.microsoft.com/office/drawing/2014/main" id="{A1D9B4C9-1348-4409-99BF-90F77BAD744C}"/>
+              </a:ext>
+            </a:extLst>
+          </p:cNvPr>
+          <p:cNvSpPr/>
+          <p:nvPr/>
+        </p:nvSpPr>
+        <p:spPr>
+          <a:xfrm>
+            <a:off x="5300317" y="4783090"/>
+            <a:ext cx="256674" cy="248652"/>
+          </a:xfrm>
+          <a:prstGeom prst="ellipse">
+            <a:avLst/>
+          </a:prstGeom>
+          <a:solidFill>
+            <a:srgbClr val="5B9BD5">
+              <a:lumMod val="75000"/>
+            </a:srgbClr>
+          </a:solidFill>
+          <a:ln w="12700" cap="flat" cmpd="sng" algn="ctr">
+            <a:solidFill>
+              <a:srgbClr val="4472C4">
+                <a:shade val="50000"/>
+              </a:srgbClr>
+            </a:solidFill>
+            <a:prstDash val="solid"/>
+            <a:miter lim="800000"/>
+          </a:ln>
+          <a:effectLst/>
+        </p:spPr>
+        <p:txBody>
+          <a:bodyPr rtlCol="0" anchor="ctr"/>
+          <a:lstStyle/>
+          <a:p>
+            <a:pPr marL="0" marR="0" lvl="0" indent="0" algn="ctr" defTabSz="914400" rtl="0" eaLnBrk="1" fontAlgn="auto" latinLnBrk="0" hangingPunct="1">
+              <a:lnSpc>
+                <a:spcPct val="100000"/>
+              </a:lnSpc>
+              <a:spcBef>
+                <a:spcPts val="0"/>
+              </a:spcBef>
+              <a:spcAft>
+                <a:spcPts val="0"/>
+              </a:spcAft>
+              <a:buClrTx/>
+              <a:buSzTx/>
+              <a:buFontTx/>
+              <a:buNone/>
+              <a:tabLst/>
+              <a:defRPr/>
+            </a:pPr>
+            <a:r>
+              <a:rPr kumimoji="0" lang="en-AU" sz="1100" b="0" i="0" u="none" strike="noStrike" kern="0" cap="none" spc="0" normalizeH="0" baseline="0" noProof="0">
+                <a:ln>
+                  <a:noFill/>
+                </a:ln>
+                <a:solidFill>
+                  <a:prstClr val="white"/>
+                </a:solidFill>
+                <a:effectLst/>
+                <a:uLnTx/>
+                <a:uFillTx/>
+                <a:latin typeface="Calibri" panose="020F0502020204030204" pitchFamily="34" charset="0"/>
+                <a:ea typeface="Verdana" panose="020B0604030504040204" pitchFamily="34" charset="0"/>
+                <a:cs typeface="Calibri" panose="020F0502020204030204" pitchFamily="34" charset="0"/>
+              </a:rPr>
+              <a:t>6</a:t>
+            </a:r>
+          </a:p>
+        </p:txBody>
+      </p:sp>
+      <p:cxnSp>
+        <p:nvCxnSpPr>
+          <p:cNvPr id="83" name="Straight Arrow Connector 82">
+            <a:extLst>
+              <a:ext uri="{FF2B5EF4-FFF2-40B4-BE49-F238E27FC236}">
+                <a16:creationId xmlns:a16="http://schemas.microsoft.com/office/drawing/2014/main" id="{A4CB47DE-926C-41D7-9219-CB85C54992B5}"/>
+              </a:ext>
+            </a:extLst>
+          </p:cNvPr>
+          <p:cNvCxnSpPr>
+            <a:cxnSpLocks/>
+          </p:cNvCxnSpPr>
+          <p:nvPr/>
+        </p:nvCxnSpPr>
+        <p:spPr>
+          <a:xfrm flipH="1">
+            <a:off x="5447208" y="3032938"/>
+            <a:ext cx="929458" cy="0"/>
+          </a:xfrm>
+          <a:prstGeom prst="straightConnector1">
+            <a:avLst/>
+          </a:prstGeom>
+          <a:noFill/>
+          <a:ln w="38100" cap="flat" cmpd="sng" algn="ctr">
+            <a:solidFill>
+              <a:srgbClr val="4472C4"/>
+            </a:solidFill>
+            <a:prstDash val="solid"/>
+            <a:miter lim="800000"/>
+            <a:headEnd type="triangle" w="med" len="med"/>
+            <a:tailEnd type="triangle" w="med" len="med"/>
+          </a:ln>
+          <a:effectLst/>
+        </p:spPr>
+      </p:cxnSp>
+      <p:cxnSp>
+        <p:nvCxnSpPr>
+          <p:cNvPr id="84" name="Straight Arrow Connector 83">
+            <a:extLst>
+              <a:ext uri="{FF2B5EF4-FFF2-40B4-BE49-F238E27FC236}">
+                <a16:creationId xmlns:a16="http://schemas.microsoft.com/office/drawing/2014/main" id="{E8F753E2-0226-4A87-A1A7-7A156E20526B}"/>
+              </a:ext>
+            </a:extLst>
+          </p:cNvPr>
+          <p:cNvCxnSpPr>
+            <a:cxnSpLocks/>
+            <a:endCxn id="51" idx="1"/>
+          </p:cNvCxnSpPr>
+          <p:nvPr/>
+        </p:nvCxnSpPr>
+        <p:spPr>
+          <a:xfrm>
+            <a:off x="5439905" y="4516353"/>
+            <a:ext cx="919894" cy="0"/>
+          </a:xfrm>
+          <a:prstGeom prst="straightConnector1">
+            <a:avLst/>
+          </a:prstGeom>
+          <a:noFill/>
+          <a:ln w="38100" cap="flat" cmpd="sng" algn="ctr">
+            <a:solidFill>
+              <a:srgbClr val="4472C4"/>
+            </a:solidFill>
+            <a:prstDash val="solid"/>
+            <a:miter lim="800000"/>
+            <a:headEnd type="triangle" w="med" len="med"/>
+            <a:tailEnd type="triangle" w="med" len="med"/>
+          </a:ln>
+          <a:effectLst/>
+        </p:spPr>
+      </p:cxnSp>
+      <p:sp>
+        <p:nvSpPr>
+          <p:cNvPr id="85" name="Rectangle 84">
+            <a:extLst>
+              <a:ext uri="{FF2B5EF4-FFF2-40B4-BE49-F238E27FC236}">
+                <a16:creationId xmlns:a16="http://schemas.microsoft.com/office/drawing/2014/main" id="{37126F2D-3ACA-4DBA-B583-93CA11A7D35A}"/>
+              </a:ext>
+            </a:extLst>
+          </p:cNvPr>
+          <p:cNvSpPr/>
+          <p:nvPr/>
+        </p:nvSpPr>
+        <p:spPr bwMode="auto">
+          <a:xfrm>
+            <a:off x="10677021" y="1915209"/>
+            <a:ext cx="1349797" cy="3383290"/>
+          </a:xfrm>
+          <a:prstGeom prst="rect">
+            <a:avLst/>
+          </a:prstGeom>
+          <a:solidFill>
+            <a:srgbClr val="C00000"/>
+          </a:solidFill>
+          <a:ln>
+            <a:noFill/>
+            <a:headEnd type="none" w="med" len="med"/>
+            <a:tailEnd type="none" w="med" len="med"/>
+          </a:ln>
+          <a:effectLst/>
+        </p:spPr>
+        <p:style>
+          <a:lnRef idx="1">
+            <a:schemeClr val="accent2"/>
+          </a:lnRef>
+          <a:fillRef idx="3">
+            <a:schemeClr val="accent2"/>
+          </a:fillRef>
+          <a:effectRef idx="2">
+            <a:schemeClr val="accent2"/>
+          </a:effectRef>
+          <a:fontRef idx="minor">
+            <a:schemeClr val="lt1"/>
+          </a:fontRef>
+        </p:style>
+        <p:txBody>
+          <a:bodyPr rot="0" spcFirstLastPara="0" vertOverflow="overflow" horzOverflow="overflow" vert="horz" wrap="square" lIns="182880" tIns="146304" rIns="182880" bIns="146304" numCol="1" spcCol="0" rtlCol="0" fromWordArt="0" anchor="t" anchorCtr="0" forceAA="0" compatLnSpc="1">
+            <a:prstTxWarp prst="textNoShape">
+              <a:avLst/>
+            </a:prstTxWarp>
+            <a:noAutofit/>
+          </a:bodyPr>
+          <a:lstStyle/>
+          <a:p>
+            <a:pPr algn="ctr" defTabSz="932472" fontAlgn="base">
+              <a:spcBef>
+                <a:spcPct val="0"/>
+              </a:spcBef>
+              <a:spcAft>
+                <a:spcPct val="0"/>
+              </a:spcAft>
+            </a:pPr>
+            <a:r>
+              <a:rPr lang="en-AU" sz="1600" dirty="0">
+                <a:solidFill>
+                  <a:schemeClr val="bg1"/>
+                </a:solidFill>
+                <a:latin typeface="Calibri" panose="020F0502020204030204" pitchFamily="34" charset="0"/>
+                <a:ea typeface="Segoe UI" pitchFamily="34" charset="0"/>
+                <a:cs typeface="Calibri" panose="020F0502020204030204" pitchFamily="34" charset="0"/>
+              </a:rPr>
+              <a:t>Cortex M4 Real-time</a:t>
+            </a:r>
+          </a:p>
+        </p:txBody>
+      </p:sp>
+      <p:sp>
+        <p:nvSpPr>
+          <p:cNvPr id="86" name="Rectangle 85">
+            <a:extLst>
+              <a:ext uri="{FF2B5EF4-FFF2-40B4-BE49-F238E27FC236}">
+                <a16:creationId xmlns:a16="http://schemas.microsoft.com/office/drawing/2014/main" id="{758263E7-C5DE-46A2-A715-39B33E9ED350}"/>
+              </a:ext>
+            </a:extLst>
+          </p:cNvPr>
+          <p:cNvSpPr/>
+          <p:nvPr/>
+        </p:nvSpPr>
+        <p:spPr>
+          <a:xfrm>
+            <a:off x="8566619" y="2752564"/>
+            <a:ext cx="1018773" cy="978613"/>
+          </a:xfrm>
+          <a:prstGeom prst="rect">
+            <a:avLst/>
+          </a:prstGeom>
+          <a:solidFill>
+            <a:srgbClr val="FFD44B"/>
+          </a:solidFill>
+          <a:ln w="12700" cap="flat" cmpd="sng" algn="ctr">
+            <a:solidFill>
+              <a:srgbClr val="4472C4">
+                <a:shade val="50000"/>
+              </a:srgbClr>
+            </a:solidFill>
+            <a:prstDash val="solid"/>
+            <a:miter lim="800000"/>
+          </a:ln>
+          <a:effectLst/>
+        </p:spPr>
+        <p:txBody>
+          <a:bodyPr rtlCol="0" anchor="ctr"/>
+          <a:lstStyle/>
+          <a:p>
+            <a:pPr marL="0" marR="0" lvl="0" indent="0" algn="ctr" defTabSz="914400" rtl="0" eaLnBrk="1" fontAlgn="auto" latinLnBrk="0" hangingPunct="1">
+              <a:lnSpc>
+                <a:spcPct val="100000"/>
+              </a:lnSpc>
+              <a:spcBef>
+                <a:spcPts val="0"/>
+              </a:spcBef>
+              <a:spcAft>
+                <a:spcPts val="0"/>
+              </a:spcAft>
+              <a:buClrTx/>
+              <a:buSzTx/>
+              <a:buFontTx/>
+              <a:buNone/>
+              <a:tabLst/>
+              <a:defRPr/>
+            </a:pPr>
+            <a:r>
+              <a:rPr kumimoji="0" lang="en-AU" sz="1200" b="0" i="0" u="none" strike="noStrike" kern="0" cap="none" spc="0" normalizeH="0" baseline="0" noProof="0" dirty="0">
+                <a:ln>
+                  <a:noFill/>
+                </a:ln>
+                <a:solidFill>
+                  <a:srgbClr val="000000"/>
+                </a:solidFill>
+                <a:effectLst/>
+                <a:uLnTx/>
+                <a:uFillTx/>
+                <a:latin typeface="Calibri" panose="020F0502020204030204" pitchFamily="34" charset="0"/>
+                <a:ea typeface="Verdana" panose="020B0604030504040204" pitchFamily="34" charset="0"/>
+                <a:cs typeface="Calibri" panose="020F0502020204030204" pitchFamily="34" charset="0"/>
+              </a:rPr>
+              <a:t>Telemetry streaming</a:t>
+            </a:r>
+          </a:p>
+        </p:txBody>
+      </p:sp>
+      <p:sp>
+        <p:nvSpPr>
+          <p:cNvPr id="87" name="Rectangle 86">
+            <a:extLst>
+              <a:ext uri="{FF2B5EF4-FFF2-40B4-BE49-F238E27FC236}">
+                <a16:creationId xmlns:a16="http://schemas.microsoft.com/office/drawing/2014/main" id="{E93DB86A-AEDE-4145-962B-F9E332A76A0F}"/>
+              </a:ext>
+            </a:extLst>
+          </p:cNvPr>
+          <p:cNvSpPr/>
+          <p:nvPr/>
+        </p:nvSpPr>
+        <p:spPr>
+          <a:xfrm>
+            <a:off x="10846083" y="2752564"/>
+            <a:ext cx="1025045" cy="978613"/>
+          </a:xfrm>
+          <a:prstGeom prst="rect">
+            <a:avLst/>
+          </a:prstGeom>
+          <a:solidFill>
+            <a:srgbClr val="FFD44B"/>
+          </a:solidFill>
+          <a:ln w="12700" cap="flat" cmpd="sng" algn="ctr">
+            <a:solidFill>
+              <a:srgbClr val="4472C4">
+                <a:shade val="50000"/>
+              </a:srgbClr>
+            </a:solidFill>
+            <a:prstDash val="solid"/>
+            <a:miter lim="800000"/>
+          </a:ln>
+          <a:effectLst/>
+        </p:spPr>
+        <p:txBody>
+          <a:bodyPr rtlCol="0" anchor="ctr"/>
+          <a:lstStyle/>
+          <a:p>
+            <a:pPr algn="ctr">
+              <a:defRPr/>
+            </a:pPr>
+            <a:r>
+              <a:rPr kumimoji="0" lang="en-AU" sz="1200" b="0" i="0" u="none" strike="noStrike" kern="1200" cap="none" spc="0" normalizeH="0" baseline="0" noProof="0" dirty="0">
+                <a:ln>
+                  <a:noFill/>
+                </a:ln>
+                <a:effectLst/>
+                <a:uLnTx/>
+                <a:uFillTx/>
+                <a:latin typeface="Calibri" panose="020F0502020204030204" pitchFamily="34" charset="0"/>
+                <a:cs typeface="Calibri" panose="020F0502020204030204" pitchFamily="34" charset="0"/>
+              </a:rPr>
+              <a:t>Environment service thread</a:t>
+            </a:r>
+          </a:p>
+        </p:txBody>
+      </p:sp>
+      <p:sp>
+        <p:nvSpPr>
+          <p:cNvPr id="88" name="Rectangle 87">
+            <a:extLst>
+              <a:ext uri="{FF2B5EF4-FFF2-40B4-BE49-F238E27FC236}">
+                <a16:creationId xmlns:a16="http://schemas.microsoft.com/office/drawing/2014/main" id="{AD863552-8E8A-47EF-B1F8-C236B9F8C070}"/>
+              </a:ext>
+            </a:extLst>
+          </p:cNvPr>
+          <p:cNvSpPr/>
+          <p:nvPr/>
+        </p:nvSpPr>
+        <p:spPr>
+          <a:xfrm>
+            <a:off x="10846083" y="4005740"/>
+            <a:ext cx="1025045" cy="978613"/>
+          </a:xfrm>
+          <a:prstGeom prst="rect">
+            <a:avLst/>
+          </a:prstGeom>
+          <a:solidFill>
+            <a:srgbClr val="FFD44B"/>
+          </a:solidFill>
+          <a:ln w="12700" cap="flat" cmpd="sng" algn="ctr">
+            <a:solidFill>
+              <a:srgbClr val="4472C4">
+                <a:shade val="50000"/>
+              </a:srgbClr>
+            </a:solidFill>
+            <a:prstDash val="solid"/>
+            <a:miter lim="800000"/>
+          </a:ln>
+          <a:effectLst/>
+        </p:spPr>
+        <p:txBody>
+          <a:bodyPr rtlCol="0" anchor="ctr"/>
+          <a:lstStyle/>
+          <a:p>
+            <a:pPr marL="0" marR="0" lvl="0" indent="0" algn="ctr" defTabSz="914400" rtl="0" eaLnBrk="1" fontAlgn="auto" latinLnBrk="0" hangingPunct="1">
+              <a:lnSpc>
+                <a:spcPct val="100000"/>
+              </a:lnSpc>
+              <a:spcBef>
+                <a:spcPts val="0"/>
+              </a:spcBef>
+              <a:spcAft>
+                <a:spcPts val="0"/>
+              </a:spcAft>
+              <a:buClrTx/>
+              <a:buSzTx/>
+              <a:buFontTx/>
+              <a:buNone/>
+              <a:tabLst/>
+              <a:defRPr/>
+            </a:pPr>
+            <a:r>
+              <a:rPr kumimoji="0" lang="en-US" sz="1200" b="0" i="0" u="none" strike="noStrike" kern="1200" cap="none" spc="0" normalizeH="0" baseline="0" noProof="0" dirty="0">
+                <a:ln>
+                  <a:noFill/>
+                </a:ln>
+                <a:effectLst/>
+                <a:uLnTx/>
+                <a:uFillTx/>
+                <a:latin typeface="Calibri" panose="020F0502020204030204" pitchFamily="34" charset="0"/>
+                <a:cs typeface="Calibri" panose="020F0502020204030204" pitchFamily="34" charset="0"/>
+              </a:rPr>
+              <a:t>Environment sensor thread</a:t>
+            </a:r>
+            <a:endParaRPr kumimoji="0" lang="en-AU" sz="1200" b="0" i="0" u="none" strike="noStrike" kern="1200" cap="none" spc="0" normalizeH="0" baseline="0" noProof="0" dirty="0">
+              <a:ln>
+                <a:noFill/>
+              </a:ln>
+              <a:effectLst/>
+              <a:uLnTx/>
+              <a:uFillTx/>
+              <a:latin typeface="Calibri" panose="020F0502020204030204" pitchFamily="34" charset="0"/>
+              <a:cs typeface="Calibri" panose="020F0502020204030204" pitchFamily="34" charset="0"/>
+            </a:endParaRPr>
+          </a:p>
+        </p:txBody>
+      </p:sp>
+      <p:sp>
+        <p:nvSpPr>
+          <p:cNvPr id="89" name="Rectangle 88">
+            <a:extLst>
+              <a:ext uri="{FF2B5EF4-FFF2-40B4-BE49-F238E27FC236}">
+                <a16:creationId xmlns:a16="http://schemas.microsoft.com/office/drawing/2014/main" id="{03FC92C1-0B3F-4E52-8885-F66C929BA989}"/>
+              </a:ext>
+            </a:extLst>
+          </p:cNvPr>
+          <p:cNvSpPr/>
+          <p:nvPr/>
+        </p:nvSpPr>
+        <p:spPr bwMode="auto">
+          <a:xfrm>
+            <a:off x="9977466" y="1915209"/>
+            <a:ext cx="396475" cy="3360200"/>
+          </a:xfrm>
+          <a:prstGeom prst="rect">
+            <a:avLst/>
+          </a:prstGeom>
+          <a:solidFill>
+            <a:srgbClr val="FFD44B"/>
+          </a:solidFill>
+          <a:ln w="12700" cap="flat" cmpd="sng" algn="ctr">
+            <a:solidFill>
+              <a:srgbClr val="4472C4">
+                <a:shade val="50000"/>
+              </a:srgbClr>
+            </a:solidFill>
+            <a:prstDash val="solid"/>
+            <a:miter lim="800000"/>
+          </a:ln>
+          <a:effectLst/>
+        </p:spPr>
+        <p:txBody>
+          <a:bodyPr vert="vert270" rtlCol="0" anchor="ctr"/>
+          <a:lstStyle/>
+          <a:p>
+            <a:pPr algn="ctr"/>
+            <a:r>
+              <a:rPr lang="en-AU" dirty="0" err="1">
+                <a:solidFill>
+                  <a:schemeClr val="tx1"/>
+                </a:solidFill>
+                <a:latin typeface="Calibri" panose="020F0502020204030204" pitchFamily="34" charset="0"/>
+                <a:cs typeface="Calibri" panose="020F0502020204030204" pitchFamily="34" charset="0"/>
+              </a:rPr>
+              <a:t>Intercore</a:t>
+            </a:r>
+            <a:r>
+              <a:rPr lang="en-AU" dirty="0">
+                <a:solidFill>
+                  <a:schemeClr val="tx1"/>
+                </a:solidFill>
+                <a:latin typeface="Calibri" panose="020F0502020204030204" pitchFamily="34" charset="0"/>
+                <a:cs typeface="Calibri" panose="020F0502020204030204" pitchFamily="34" charset="0"/>
+              </a:rPr>
+              <a:t> message bridge</a:t>
+            </a:r>
+          </a:p>
+        </p:txBody>
+      </p:sp>
+      <p:cxnSp>
+        <p:nvCxnSpPr>
+          <p:cNvPr id="90" name="Straight Arrow Connector 89">
+            <a:extLst>
+              <a:ext uri="{FF2B5EF4-FFF2-40B4-BE49-F238E27FC236}">
+                <a16:creationId xmlns:a16="http://schemas.microsoft.com/office/drawing/2014/main" id="{751D8B74-EF86-41DA-83F1-A0E131328374}"/>
+              </a:ext>
+            </a:extLst>
+          </p:cNvPr>
+          <p:cNvCxnSpPr>
+            <a:cxnSpLocks/>
+          </p:cNvCxnSpPr>
+          <p:nvPr/>
+        </p:nvCxnSpPr>
+        <p:spPr>
+          <a:xfrm flipH="1">
+            <a:off x="7663396" y="3239373"/>
+            <a:ext cx="915242" cy="0"/>
+          </a:xfrm>
+          <a:prstGeom prst="straightConnector1">
+            <a:avLst/>
+          </a:prstGeom>
+          <a:noFill/>
+          <a:ln w="38100" cap="flat" cmpd="sng" algn="ctr">
+            <a:solidFill>
+              <a:srgbClr val="4472C4"/>
+            </a:solidFill>
+            <a:prstDash val="solid"/>
+            <a:miter lim="800000"/>
+            <a:tailEnd type="triangle"/>
+          </a:ln>
+          <a:effectLst/>
+        </p:spPr>
+      </p:cxnSp>
+      <p:sp>
+        <p:nvSpPr>
+          <p:cNvPr id="91" name="TextBox 90">
+            <a:extLst>
+              <a:ext uri="{FF2B5EF4-FFF2-40B4-BE49-F238E27FC236}">
+                <a16:creationId xmlns:a16="http://schemas.microsoft.com/office/drawing/2014/main" id="{25FCF15B-DFF7-4186-A044-186F30D73AFE}"/>
+              </a:ext>
+            </a:extLst>
+          </p:cNvPr>
+          <p:cNvSpPr txBox="1"/>
+          <p:nvPr/>
+        </p:nvSpPr>
+        <p:spPr>
+          <a:xfrm>
+            <a:off x="6447259" y="2903989"/>
+            <a:ext cx="1154162" cy="846386"/>
+          </a:xfrm>
+          <a:prstGeom prst="rect">
+            <a:avLst/>
+          </a:prstGeom>
+          <a:noFill/>
+        </p:spPr>
+        <p:txBody>
+          <a:bodyPr wrap="none" lIns="0" tIns="0" rIns="0" bIns="0" rtlCol="0">
+            <a:spAutoFit/>
+          </a:bodyPr>
+          <a:lstStyle/>
+          <a:p>
+            <a:pPr algn="l"/>
+            <a:r>
+              <a:rPr lang="en-AU" sz="1100" dirty="0">
+                <a:latin typeface="Calibri" panose="020F0502020204030204" pitchFamily="34" charset="0"/>
+                <a:cs typeface="Calibri" panose="020F0502020204030204" pitchFamily="34" charset="0"/>
+              </a:rPr>
+              <a:t>{ </a:t>
+            </a:r>
+          </a:p>
+          <a:p>
+            <a:pPr algn="l"/>
+            <a:r>
+              <a:rPr lang="en-AU" sz="1100" dirty="0">
+                <a:latin typeface="Calibri" panose="020F0502020204030204" pitchFamily="34" charset="0"/>
+                <a:cs typeface="Calibri" panose="020F0502020204030204" pitchFamily="34" charset="0"/>
+              </a:rPr>
+              <a:t>  “Temperature”:26,</a:t>
+            </a:r>
+          </a:p>
+          <a:p>
+            <a:pPr algn="l"/>
+            <a:r>
+              <a:rPr lang="en-AU" sz="1100" dirty="0">
+                <a:latin typeface="Calibri" panose="020F0502020204030204" pitchFamily="34" charset="0"/>
+                <a:cs typeface="Calibri" panose="020F0502020204030204" pitchFamily="34" charset="0"/>
+              </a:rPr>
+              <a:t>  “Humidity”:55,</a:t>
+            </a:r>
+          </a:p>
+          <a:p>
+            <a:pPr algn="l"/>
+            <a:r>
+              <a:rPr lang="en-AU" sz="1100" dirty="0">
+                <a:latin typeface="Calibri" panose="020F0502020204030204" pitchFamily="34" charset="0"/>
+                <a:cs typeface="Calibri" panose="020F0502020204030204" pitchFamily="34" charset="0"/>
+              </a:rPr>
+              <a:t>  “Pressure”: 1100</a:t>
+            </a:r>
+          </a:p>
+          <a:p>
+            <a:pPr algn="l"/>
+            <a:r>
+              <a:rPr lang="en-AU" sz="1100" dirty="0">
+                <a:latin typeface="Calibri" panose="020F0502020204030204" pitchFamily="34" charset="0"/>
+                <a:cs typeface="Calibri" panose="020F0502020204030204" pitchFamily="34" charset="0"/>
+              </a:rPr>
+              <a:t>}</a:t>
+            </a:r>
+          </a:p>
+        </p:txBody>
+      </p:sp>
+      <p:sp>
+        <p:nvSpPr>
+          <p:cNvPr id="92" name="Rectangle 91">
+            <a:extLst>
+              <a:ext uri="{FF2B5EF4-FFF2-40B4-BE49-F238E27FC236}">
+                <a16:creationId xmlns:a16="http://schemas.microsoft.com/office/drawing/2014/main" id="{62D7CB87-1240-4B37-A7CE-7D976778AD4E}"/>
+              </a:ext>
+            </a:extLst>
+          </p:cNvPr>
+          <p:cNvSpPr/>
+          <p:nvPr/>
+        </p:nvSpPr>
+        <p:spPr>
+          <a:xfrm>
+            <a:off x="8566618" y="4048351"/>
+            <a:ext cx="1018774" cy="936002"/>
+          </a:xfrm>
+          <a:prstGeom prst="rect">
+            <a:avLst/>
+          </a:prstGeom>
+          <a:solidFill>
+            <a:srgbClr val="FFD44B"/>
+          </a:solidFill>
+          <a:ln w="12700" cap="flat" cmpd="sng" algn="ctr">
+            <a:solidFill>
+              <a:srgbClr val="4472C4">
+                <a:shade val="50000"/>
+              </a:srgbClr>
+            </a:solidFill>
+            <a:prstDash val="solid"/>
+            <a:miter lim="800000"/>
+          </a:ln>
+          <a:effectLst/>
+        </p:spPr>
+        <p:txBody>
+          <a:bodyPr rtlCol="0" anchor="ctr"/>
+          <a:lstStyle/>
+          <a:p>
+            <a:pPr marL="0" marR="0" lvl="0" indent="0" algn="ctr" defTabSz="914400" rtl="0" eaLnBrk="1" fontAlgn="auto" latinLnBrk="0" hangingPunct="1">
+              <a:lnSpc>
+                <a:spcPct val="100000"/>
+              </a:lnSpc>
+              <a:spcBef>
+                <a:spcPts val="0"/>
+              </a:spcBef>
+              <a:spcAft>
+                <a:spcPts val="0"/>
+              </a:spcAft>
+              <a:buClrTx/>
+              <a:buSzTx/>
+              <a:buFontTx/>
+              <a:buNone/>
+              <a:tabLst/>
+              <a:defRPr/>
+            </a:pPr>
+            <a:r>
+              <a:rPr kumimoji="0" lang="en-AU" sz="1200" b="0" i="0" u="none" strike="noStrike" kern="0" cap="none" spc="0" normalizeH="0" baseline="0" noProof="0" dirty="0">
+                <a:ln>
+                  <a:noFill/>
+                </a:ln>
+                <a:solidFill>
+                  <a:srgbClr val="000000"/>
+                </a:solidFill>
+                <a:effectLst/>
+                <a:uLnTx/>
+                <a:uFillTx/>
+                <a:latin typeface="Calibri" panose="020F0502020204030204" pitchFamily="34" charset="0"/>
+                <a:ea typeface="Verdana" panose="020B0604030504040204" pitchFamily="34" charset="0"/>
+                <a:cs typeface="Calibri" panose="020F0502020204030204" pitchFamily="34" charset="0"/>
+              </a:rPr>
+              <a:t>Device twin virtual HVAC control</a:t>
+            </a:r>
+          </a:p>
+        </p:txBody>
+      </p:sp>
+      <p:sp>
+        <p:nvSpPr>
+          <p:cNvPr id="93" name="Oval 92">
+            <a:extLst>
+              <a:ext uri="{FF2B5EF4-FFF2-40B4-BE49-F238E27FC236}">
+                <a16:creationId xmlns:a16="http://schemas.microsoft.com/office/drawing/2014/main" id="{E697B7BC-818E-4FED-8CA0-E72BF4A84ABF}"/>
+              </a:ext>
+            </a:extLst>
+          </p:cNvPr>
+          <p:cNvSpPr/>
+          <p:nvPr/>
+        </p:nvSpPr>
+        <p:spPr>
+          <a:xfrm>
+            <a:off x="11742791" y="2628238"/>
+            <a:ext cx="256674" cy="248652"/>
+          </a:xfrm>
+          <a:prstGeom prst="ellipse">
+            <a:avLst/>
+          </a:prstGeom>
+          <a:solidFill>
+            <a:srgbClr val="5B9BD5">
+              <a:lumMod val="75000"/>
+            </a:srgbClr>
+          </a:solidFill>
+          <a:ln w="12700" cap="flat" cmpd="sng" algn="ctr">
+            <a:solidFill>
+              <a:srgbClr val="4472C4">
+                <a:shade val="50000"/>
+              </a:srgbClr>
+            </a:solidFill>
+            <a:prstDash val="solid"/>
+            <a:miter lim="800000"/>
+          </a:ln>
+          <a:effectLst/>
+        </p:spPr>
+        <p:txBody>
+          <a:bodyPr rtlCol="0" anchor="ctr"/>
+          <a:lstStyle/>
+          <a:p>
+            <a:pPr marL="0" marR="0" lvl="0" indent="0" algn="ctr" defTabSz="914400" rtl="0" eaLnBrk="1" fontAlgn="auto" latinLnBrk="0" hangingPunct="1">
+              <a:lnSpc>
+                <a:spcPct val="100000"/>
+              </a:lnSpc>
+              <a:spcBef>
+                <a:spcPts val="0"/>
+              </a:spcBef>
+              <a:spcAft>
+                <a:spcPts val="0"/>
+              </a:spcAft>
+              <a:buClrTx/>
+              <a:buSzTx/>
+              <a:buFontTx/>
+              <a:buNone/>
+              <a:tabLst/>
+              <a:defRPr/>
+            </a:pPr>
+            <a:r>
+              <a:rPr lang="en-AU" sz="1100" kern="0" dirty="0">
+                <a:solidFill>
+                  <a:prstClr val="white"/>
+                </a:solidFill>
+                <a:latin typeface="Calibri" panose="020F0502020204030204" pitchFamily="34" charset="0"/>
+                <a:ea typeface="Verdana" panose="020B0604030504040204" pitchFamily="34" charset="0"/>
+                <a:cs typeface="Calibri" panose="020F0502020204030204" pitchFamily="34" charset="0"/>
+              </a:rPr>
+              <a:t>3</a:t>
+            </a:r>
+            <a:endParaRPr kumimoji="0" lang="en-AU" sz="1100" b="0" i="0" u="none" strike="noStrike" kern="0" cap="none" spc="0" normalizeH="0" baseline="0" noProof="0" dirty="0">
+              <a:ln>
+                <a:noFill/>
+              </a:ln>
+              <a:solidFill>
+                <a:prstClr val="white"/>
+              </a:solidFill>
+              <a:effectLst/>
+              <a:uLnTx/>
+              <a:uFillTx/>
+              <a:latin typeface="Calibri" panose="020F0502020204030204" pitchFamily="34" charset="0"/>
+              <a:ea typeface="Verdana" panose="020B0604030504040204" pitchFamily="34" charset="0"/>
+              <a:cs typeface="Calibri" panose="020F0502020204030204" pitchFamily="34" charset="0"/>
+            </a:endParaRPr>
+          </a:p>
+        </p:txBody>
+      </p:sp>
+      <p:sp>
+        <p:nvSpPr>
+          <p:cNvPr id="94" name="Oval 93">
+            <a:extLst>
+              <a:ext uri="{FF2B5EF4-FFF2-40B4-BE49-F238E27FC236}">
+                <a16:creationId xmlns:a16="http://schemas.microsoft.com/office/drawing/2014/main" id="{844CD143-592D-443F-9596-AF6634715B2C}"/>
+              </a:ext>
+            </a:extLst>
+          </p:cNvPr>
+          <p:cNvSpPr/>
+          <p:nvPr/>
+        </p:nvSpPr>
+        <p:spPr>
+          <a:xfrm>
+            <a:off x="5300317" y="2202245"/>
+            <a:ext cx="256674" cy="248652"/>
+          </a:xfrm>
+          <a:prstGeom prst="ellipse">
+            <a:avLst/>
+          </a:prstGeom>
+          <a:solidFill>
+            <a:srgbClr val="5B9BD5">
+              <a:lumMod val="75000"/>
+            </a:srgbClr>
+          </a:solidFill>
+          <a:ln w="12700" cap="flat" cmpd="sng" algn="ctr">
+            <a:solidFill>
+              <a:srgbClr val="4472C4">
+                <a:shade val="50000"/>
+              </a:srgbClr>
+            </a:solidFill>
+            <a:prstDash val="solid"/>
+            <a:miter lim="800000"/>
+          </a:ln>
+          <a:effectLst/>
+        </p:spPr>
+        <p:txBody>
+          <a:bodyPr rtlCol="0" anchor="ctr"/>
+          <a:lstStyle/>
+          <a:p>
+            <a:pPr marL="0" marR="0" lvl="0" indent="0" algn="ctr" defTabSz="914400" rtl="0" eaLnBrk="1" fontAlgn="auto" latinLnBrk="0" hangingPunct="1">
+              <a:lnSpc>
+                <a:spcPct val="100000"/>
+              </a:lnSpc>
+              <a:spcBef>
+                <a:spcPts val="0"/>
+              </a:spcBef>
+              <a:spcAft>
+                <a:spcPts val="0"/>
+              </a:spcAft>
+              <a:buClrTx/>
+              <a:buSzTx/>
+              <a:buFontTx/>
+              <a:buNone/>
+              <a:tabLst/>
+              <a:defRPr/>
+            </a:pPr>
+            <a:r>
+              <a:rPr kumimoji="0" lang="en-AU" sz="1100" b="0" i="0" u="none" strike="noStrike" kern="0" cap="none" spc="0" normalizeH="0" baseline="0" noProof="0" dirty="0">
+                <a:ln>
+                  <a:noFill/>
+                </a:ln>
+                <a:solidFill>
+                  <a:prstClr val="white"/>
+                </a:solidFill>
+                <a:effectLst/>
+                <a:uLnTx/>
+                <a:uFillTx/>
+                <a:latin typeface="Calibri" panose="020F0502020204030204" pitchFamily="34" charset="0"/>
+                <a:ea typeface="Verdana" panose="020B0604030504040204" pitchFamily="34" charset="0"/>
+                <a:cs typeface="Calibri" panose="020F0502020204030204" pitchFamily="34" charset="0"/>
+              </a:rPr>
+              <a:t>5</a:t>
+            </a:r>
+          </a:p>
+        </p:txBody>
+      </p:sp>
+      <p:sp>
+        <p:nvSpPr>
+          <p:cNvPr id="97" name="Oval 96">
+            <a:extLst>
+              <a:ext uri="{FF2B5EF4-FFF2-40B4-BE49-F238E27FC236}">
+                <a16:creationId xmlns:a16="http://schemas.microsoft.com/office/drawing/2014/main" id="{B352CCD6-9A7C-44A3-9F7D-6505DB59DC52}"/>
+              </a:ext>
+            </a:extLst>
+          </p:cNvPr>
+          <p:cNvSpPr/>
+          <p:nvPr/>
+        </p:nvSpPr>
+        <p:spPr>
+          <a:xfrm>
+            <a:off x="9452722" y="3941921"/>
+            <a:ext cx="256674" cy="248652"/>
+          </a:xfrm>
+          <a:prstGeom prst="ellipse">
+            <a:avLst/>
+          </a:prstGeom>
+          <a:solidFill>
+            <a:srgbClr val="5B9BD5">
+              <a:lumMod val="75000"/>
+            </a:srgbClr>
+          </a:solidFill>
+          <a:ln w="12700" cap="flat" cmpd="sng" algn="ctr">
+            <a:solidFill>
+              <a:srgbClr val="4472C4">
+                <a:shade val="50000"/>
+              </a:srgbClr>
+            </a:solidFill>
+            <a:prstDash val="solid"/>
+            <a:miter lim="800000"/>
+          </a:ln>
+          <a:effectLst/>
+        </p:spPr>
+        <p:txBody>
+          <a:bodyPr rtlCol="0" anchor="ctr"/>
+          <a:lstStyle/>
+          <a:p>
+            <a:pPr marL="0" marR="0" lvl="0" indent="0" algn="ctr" defTabSz="914400" rtl="0" eaLnBrk="1" fontAlgn="auto" latinLnBrk="0" hangingPunct="1">
+              <a:lnSpc>
+                <a:spcPct val="100000"/>
+              </a:lnSpc>
+              <a:spcBef>
+                <a:spcPts val="0"/>
+              </a:spcBef>
+              <a:spcAft>
+                <a:spcPts val="0"/>
+              </a:spcAft>
+              <a:buClrTx/>
+              <a:buSzTx/>
+              <a:buFontTx/>
+              <a:buNone/>
+              <a:tabLst/>
+              <a:defRPr/>
+            </a:pPr>
+            <a:r>
+              <a:rPr kumimoji="0" lang="en-US" sz="1100" b="0" i="0" u="none" strike="noStrike" kern="0" cap="none" spc="0" normalizeH="0" baseline="0" noProof="0" dirty="0">
+                <a:ln>
+                  <a:noFill/>
+                </a:ln>
+                <a:solidFill>
+                  <a:prstClr val="white"/>
+                </a:solidFill>
+                <a:effectLst/>
+                <a:uLnTx/>
+                <a:uFillTx/>
+                <a:latin typeface="Calibri" panose="020F0502020204030204" pitchFamily="34" charset="0"/>
+                <a:ea typeface="Verdana" panose="020B0604030504040204" pitchFamily="34" charset="0"/>
+                <a:cs typeface="Calibri" panose="020F0502020204030204" pitchFamily="34" charset="0"/>
+              </a:rPr>
+              <a:t>7</a:t>
+            </a:r>
+            <a:endParaRPr kumimoji="0" lang="en-AU" sz="1100" b="0" i="0" u="none" strike="noStrike" kern="0" cap="none" spc="0" normalizeH="0" baseline="0" noProof="0" dirty="0">
+              <a:ln>
+                <a:noFill/>
+              </a:ln>
+              <a:solidFill>
+                <a:prstClr val="white"/>
+              </a:solidFill>
+              <a:effectLst/>
+              <a:uLnTx/>
+              <a:uFillTx/>
+              <a:latin typeface="Calibri" panose="020F0502020204030204" pitchFamily="34" charset="0"/>
+              <a:ea typeface="Verdana" panose="020B0604030504040204" pitchFamily="34" charset="0"/>
+              <a:cs typeface="Calibri" panose="020F0502020204030204" pitchFamily="34" charset="0"/>
+            </a:endParaRPr>
+          </a:p>
+        </p:txBody>
+      </p:sp>
+      <p:cxnSp>
+        <p:nvCxnSpPr>
+          <p:cNvPr id="99" name="Straight Arrow Connector 98">
+            <a:extLst>
+              <a:ext uri="{FF2B5EF4-FFF2-40B4-BE49-F238E27FC236}">
+                <a16:creationId xmlns:a16="http://schemas.microsoft.com/office/drawing/2014/main" id="{51662D48-7499-4D9F-9EE0-99B4E7BB902D}"/>
+              </a:ext>
+            </a:extLst>
+          </p:cNvPr>
+          <p:cNvCxnSpPr>
+            <a:cxnSpLocks/>
+          </p:cNvCxnSpPr>
+          <p:nvPr/>
+        </p:nvCxnSpPr>
+        <p:spPr>
+          <a:xfrm flipV="1">
+            <a:off x="7663396" y="4640644"/>
+            <a:ext cx="915242" cy="382"/>
+          </a:xfrm>
+          <a:prstGeom prst="straightConnector1">
+            <a:avLst/>
+          </a:prstGeom>
+          <a:noFill/>
+          <a:ln w="38100" cap="flat" cmpd="sng" algn="ctr">
+            <a:solidFill>
+              <a:srgbClr val="4472C4"/>
+            </a:solidFill>
+            <a:prstDash val="solid"/>
+            <a:miter lim="800000"/>
+            <a:headEnd type="triangle" w="med" len="med"/>
+            <a:tailEnd type="triangle" w="med" len="med"/>
+          </a:ln>
+          <a:effectLst/>
+        </p:spPr>
+      </p:cxnSp>
+      <p:cxnSp>
+        <p:nvCxnSpPr>
+          <p:cNvPr id="100" name="Straight Arrow Connector 99">
+            <a:extLst>
+              <a:ext uri="{FF2B5EF4-FFF2-40B4-BE49-F238E27FC236}">
+                <a16:creationId xmlns:a16="http://schemas.microsoft.com/office/drawing/2014/main" id="{26C12377-EEC6-40D7-921E-4BA5BDAB2202}"/>
+              </a:ext>
+            </a:extLst>
+          </p:cNvPr>
+          <p:cNvCxnSpPr>
+            <a:cxnSpLocks/>
+          </p:cNvCxnSpPr>
+          <p:nvPr/>
+        </p:nvCxnSpPr>
+        <p:spPr>
+          <a:xfrm>
+            <a:off x="9602484" y="3050910"/>
+            <a:ext cx="374982" cy="0"/>
+          </a:xfrm>
+          <a:prstGeom prst="straightConnector1">
+            <a:avLst/>
+          </a:prstGeom>
+          <a:noFill/>
+          <a:ln w="38100" cap="flat" cmpd="sng" algn="ctr">
+            <a:solidFill>
+              <a:srgbClr val="4472C4"/>
+            </a:solidFill>
+            <a:prstDash val="solid"/>
+            <a:miter lim="800000"/>
+            <a:headEnd type="triangle" w="med" len="med"/>
+            <a:tailEnd type="triangle" w="med" len="med"/>
+          </a:ln>
+          <a:effectLst/>
+        </p:spPr>
+      </p:cxnSp>
+      <p:cxnSp>
+        <p:nvCxnSpPr>
+          <p:cNvPr id="101" name="Straight Arrow Connector 100">
+            <a:extLst>
+              <a:ext uri="{FF2B5EF4-FFF2-40B4-BE49-F238E27FC236}">
+                <a16:creationId xmlns:a16="http://schemas.microsoft.com/office/drawing/2014/main" id="{E59523DB-0E26-4829-A4E7-9B3AC02E8FE6}"/>
+              </a:ext>
+            </a:extLst>
+          </p:cNvPr>
+          <p:cNvCxnSpPr>
+            <a:cxnSpLocks/>
+          </p:cNvCxnSpPr>
+          <p:nvPr/>
+        </p:nvCxnSpPr>
+        <p:spPr>
+          <a:xfrm>
+            <a:off x="10373941" y="3050910"/>
+            <a:ext cx="374982" cy="0"/>
+          </a:xfrm>
+          <a:prstGeom prst="straightConnector1">
+            <a:avLst/>
+          </a:prstGeom>
+          <a:noFill/>
+          <a:ln w="38100" cap="flat" cmpd="sng" algn="ctr">
+            <a:solidFill>
+              <a:srgbClr val="4472C4"/>
+            </a:solidFill>
+            <a:prstDash val="solid"/>
+            <a:miter lim="800000"/>
+            <a:headEnd type="triangle" w="med" len="med"/>
+            <a:tailEnd type="triangle" w="med" len="med"/>
+          </a:ln>
+          <a:effectLst/>
+        </p:spPr>
+      </p:cxnSp>
+      <p:sp>
+        <p:nvSpPr>
+          <p:cNvPr id="102" name="Oval 101">
+            <a:extLst>
+              <a:ext uri="{FF2B5EF4-FFF2-40B4-BE49-F238E27FC236}">
+                <a16:creationId xmlns:a16="http://schemas.microsoft.com/office/drawing/2014/main" id="{50CE9048-C709-4071-B30F-CF284705DD35}"/>
+              </a:ext>
+            </a:extLst>
+          </p:cNvPr>
+          <p:cNvSpPr/>
+          <p:nvPr/>
+        </p:nvSpPr>
+        <p:spPr>
+          <a:xfrm>
+            <a:off x="7535059" y="2534690"/>
+            <a:ext cx="256674" cy="248652"/>
+          </a:xfrm>
+          <a:prstGeom prst="ellipse">
+            <a:avLst/>
+          </a:prstGeom>
+          <a:solidFill>
+            <a:srgbClr val="5B9BD5">
+              <a:lumMod val="75000"/>
+            </a:srgbClr>
+          </a:solidFill>
+          <a:ln w="12700" cap="flat" cmpd="sng" algn="ctr">
+            <a:solidFill>
+              <a:srgbClr val="4472C4">
+                <a:shade val="50000"/>
+              </a:srgbClr>
+            </a:solidFill>
+            <a:prstDash val="solid"/>
+            <a:miter lim="800000"/>
+          </a:ln>
+          <a:effectLst/>
+        </p:spPr>
+        <p:txBody>
+          <a:bodyPr rtlCol="0" anchor="ctr"/>
+          <a:lstStyle/>
+          <a:p>
+            <a:pPr marL="0" marR="0" lvl="0" indent="0" algn="ctr" defTabSz="914400" rtl="0" eaLnBrk="1" fontAlgn="auto" latinLnBrk="0" hangingPunct="1">
+              <a:lnSpc>
+                <a:spcPct val="100000"/>
+              </a:lnSpc>
+              <a:spcBef>
+                <a:spcPts val="0"/>
+              </a:spcBef>
+              <a:spcAft>
+                <a:spcPts val="0"/>
+              </a:spcAft>
+              <a:buClrTx/>
+              <a:buSzTx/>
+              <a:buFontTx/>
+              <a:buNone/>
+              <a:tabLst/>
+              <a:defRPr/>
+            </a:pPr>
+            <a:r>
+              <a:rPr lang="en-AU" sz="1100" kern="0" dirty="0">
+                <a:solidFill>
+                  <a:prstClr val="white"/>
+                </a:solidFill>
+                <a:latin typeface="Calibri" panose="020F0502020204030204" pitchFamily="34" charset="0"/>
+                <a:ea typeface="Verdana" panose="020B0604030504040204" pitchFamily="34" charset="0"/>
+                <a:cs typeface="Calibri" panose="020F0502020204030204" pitchFamily="34" charset="0"/>
+              </a:rPr>
+              <a:t>4</a:t>
+            </a:r>
+            <a:endParaRPr kumimoji="0" lang="en-AU" sz="1100" b="0" i="0" u="none" strike="noStrike" kern="0" cap="none" spc="0" normalizeH="0" baseline="0" noProof="0" dirty="0">
+              <a:ln>
+                <a:noFill/>
+              </a:ln>
+              <a:solidFill>
+                <a:prstClr val="white"/>
+              </a:solidFill>
+              <a:effectLst/>
+              <a:uLnTx/>
+              <a:uFillTx/>
+              <a:latin typeface="Calibri" panose="020F0502020204030204" pitchFamily="34" charset="0"/>
+              <a:ea typeface="Verdana" panose="020B0604030504040204" pitchFamily="34" charset="0"/>
+              <a:cs typeface="Calibri" panose="020F0502020204030204" pitchFamily="34" charset="0"/>
+            </a:endParaRPr>
+          </a:p>
+        </p:txBody>
+      </p:sp>
+      <p:pic>
+        <p:nvPicPr>
+          <p:cNvPr id="103" name="Picture 102">
+            <a:extLst>
+              <a:ext uri="{FF2B5EF4-FFF2-40B4-BE49-F238E27FC236}">
+                <a16:creationId xmlns:a16="http://schemas.microsoft.com/office/drawing/2014/main" id="{CF4ACF53-8DC3-4FB2-AB98-F5BF928C2573}"/>
+              </a:ext>
+            </a:extLst>
+          </p:cNvPr>
+          <p:cNvPicPr>
+            <a:picLocks noChangeAspect="1"/>
+          </p:cNvPicPr>
+          <p:nvPr/>
+        </p:nvPicPr>
+        <p:blipFill>
+          <a:blip r:embed="rId14"/>
+          <a:stretch>
+            <a:fillRect/>
+          </a:stretch>
+        </p:blipFill>
+        <p:spPr>
+          <a:xfrm>
+            <a:off x="4247715" y="2561963"/>
+            <a:ext cx="1135409" cy="936214"/>
+          </a:xfrm>
+          <a:prstGeom prst="rect">
+            <a:avLst/>
+          </a:prstGeom>
+        </p:spPr>
+      </p:pic>
+      <p:sp>
+        <p:nvSpPr>
+          <p:cNvPr id="104" name="Oval 103">
+            <a:extLst>
+              <a:ext uri="{FF2B5EF4-FFF2-40B4-BE49-F238E27FC236}">
+                <a16:creationId xmlns:a16="http://schemas.microsoft.com/office/drawing/2014/main" id="{E284B86A-EB39-4DAA-9378-E93E180ADABA}"/>
+              </a:ext>
+            </a:extLst>
+          </p:cNvPr>
+          <p:cNvSpPr/>
+          <p:nvPr/>
+        </p:nvSpPr>
+        <p:spPr>
+          <a:xfrm>
+            <a:off x="9427779" y="2620913"/>
+            <a:ext cx="256674" cy="248652"/>
+          </a:xfrm>
+          <a:prstGeom prst="ellipse">
+            <a:avLst/>
+          </a:prstGeom>
+          <a:solidFill>
+            <a:srgbClr val="5B9BD5">
+              <a:lumMod val="75000"/>
+            </a:srgbClr>
+          </a:solidFill>
+          <a:ln w="12700" cap="flat" cmpd="sng" algn="ctr">
+            <a:solidFill>
+              <a:srgbClr val="4472C4">
+                <a:shade val="50000"/>
+              </a:srgbClr>
+            </a:solidFill>
+            <a:prstDash val="solid"/>
+            <a:miter lim="800000"/>
+          </a:ln>
+          <a:effectLst/>
+        </p:spPr>
+        <p:txBody>
+          <a:bodyPr rtlCol="0" anchor="ctr"/>
+          <a:lstStyle/>
+          <a:p>
+            <a:pPr marL="0" marR="0" lvl="0" indent="0" algn="ctr" defTabSz="914400" rtl="0" eaLnBrk="1" fontAlgn="auto" latinLnBrk="0" hangingPunct="1">
+              <a:lnSpc>
+                <a:spcPct val="100000"/>
+              </a:lnSpc>
+              <a:spcBef>
+                <a:spcPts val="0"/>
+              </a:spcBef>
+              <a:spcAft>
+                <a:spcPts val="0"/>
+              </a:spcAft>
+              <a:buClrTx/>
+              <a:buSzTx/>
+              <a:buFontTx/>
+              <a:buNone/>
+              <a:tabLst/>
+              <a:defRPr/>
+            </a:pPr>
+            <a:r>
+              <a:rPr kumimoji="0" lang="en-AU" sz="1100" b="0" i="0" u="none" strike="noStrike" kern="0" cap="none" spc="0" normalizeH="0" baseline="0" noProof="0" dirty="0">
+                <a:ln>
+                  <a:noFill/>
+                </a:ln>
+                <a:solidFill>
+                  <a:prstClr val="white"/>
+                </a:solidFill>
+                <a:effectLst/>
+                <a:uLnTx/>
+                <a:uFillTx/>
+                <a:latin typeface="Calibri" panose="020F0502020204030204" pitchFamily="34" charset="0"/>
+                <a:ea typeface="Verdana" panose="020B0604030504040204" pitchFamily="34" charset="0"/>
+                <a:cs typeface="Calibri" panose="020F0502020204030204" pitchFamily="34" charset="0"/>
+              </a:rPr>
+              <a:t>2</a:t>
+            </a:r>
+          </a:p>
+        </p:txBody>
+      </p:sp>
+      <p:sp>
+        <p:nvSpPr>
+          <p:cNvPr id="105" name="Oval 104">
+            <a:extLst>
+              <a:ext uri="{FF2B5EF4-FFF2-40B4-BE49-F238E27FC236}">
+                <a16:creationId xmlns:a16="http://schemas.microsoft.com/office/drawing/2014/main" id="{962F0061-0570-4822-8F55-9FC4F657C610}"/>
+              </a:ext>
+            </a:extLst>
+          </p:cNvPr>
+          <p:cNvSpPr/>
+          <p:nvPr/>
+        </p:nvSpPr>
+        <p:spPr>
+          <a:xfrm>
+            <a:off x="11743435" y="3885749"/>
+            <a:ext cx="256674" cy="248652"/>
+          </a:xfrm>
+          <a:prstGeom prst="ellipse">
+            <a:avLst/>
+          </a:prstGeom>
+          <a:solidFill>
+            <a:srgbClr val="5B9BD5">
+              <a:lumMod val="75000"/>
+            </a:srgbClr>
+          </a:solidFill>
+          <a:ln w="12700" cap="flat" cmpd="sng" algn="ctr">
+            <a:solidFill>
+              <a:srgbClr val="4472C4">
+                <a:shade val="50000"/>
+              </a:srgbClr>
+            </a:solidFill>
+            <a:prstDash val="solid"/>
+            <a:miter lim="800000"/>
+          </a:ln>
+          <a:effectLst/>
+        </p:spPr>
+        <p:txBody>
+          <a:bodyPr rtlCol="0" anchor="ctr"/>
+          <a:lstStyle/>
+          <a:p>
+            <a:pPr marL="0" marR="0" lvl="0" indent="0" algn="ctr" defTabSz="914400" rtl="0" eaLnBrk="1" fontAlgn="auto" latinLnBrk="0" hangingPunct="1">
+              <a:lnSpc>
+                <a:spcPct val="100000"/>
+              </a:lnSpc>
+              <a:spcBef>
+                <a:spcPts val="0"/>
+              </a:spcBef>
+              <a:spcAft>
+                <a:spcPts val="0"/>
+              </a:spcAft>
+              <a:buClrTx/>
+              <a:buSzTx/>
+              <a:buFontTx/>
+              <a:buNone/>
+              <a:tabLst/>
+              <a:defRPr/>
+            </a:pPr>
+            <a:r>
+              <a:rPr kumimoji="0" lang="en-AU" sz="1100" b="0" i="0" u="none" strike="noStrike" kern="0" cap="none" spc="0" normalizeH="0" baseline="0" noProof="0" dirty="0">
+                <a:ln>
+                  <a:noFill/>
+                </a:ln>
+                <a:solidFill>
+                  <a:prstClr val="white"/>
+                </a:solidFill>
+                <a:effectLst/>
+                <a:uLnTx/>
+                <a:uFillTx/>
+                <a:latin typeface="Calibri" panose="020F0502020204030204" pitchFamily="34" charset="0"/>
+                <a:ea typeface="Verdana" panose="020B0604030504040204" pitchFamily="34" charset="0"/>
+                <a:cs typeface="Calibri" panose="020F0502020204030204" pitchFamily="34" charset="0"/>
+              </a:rPr>
+              <a:t>1</a:t>
+            </a:r>
+          </a:p>
+        </p:txBody>
+      </p:sp>
+      <p:pic>
+        <p:nvPicPr>
+          <p:cNvPr id="106" name="Picture 105">
+            <a:extLst>
+              <a:ext uri="{FF2B5EF4-FFF2-40B4-BE49-F238E27FC236}">
+                <a16:creationId xmlns:a16="http://schemas.microsoft.com/office/drawing/2014/main" id="{9E455ECC-2586-4153-9975-67680F3ABECE}"/>
+              </a:ext>
+            </a:extLst>
+          </p:cNvPr>
+          <p:cNvPicPr>
+            <a:picLocks noChangeAspect="1"/>
+          </p:cNvPicPr>
+          <p:nvPr/>
+        </p:nvPicPr>
+        <p:blipFill>
+          <a:blip r:embed="rId15"/>
+          <a:stretch>
+            <a:fillRect/>
+          </a:stretch>
+        </p:blipFill>
+        <p:spPr>
+          <a:xfrm>
+            <a:off x="4250475" y="3831760"/>
+            <a:ext cx="1130303" cy="874854"/>
+          </a:xfrm>
+          <a:prstGeom prst="rect">
+            <a:avLst/>
+          </a:prstGeom>
+        </p:spPr>
+      </p:pic>
+      <p:sp>
+        <p:nvSpPr>
+          <p:cNvPr id="45" name="Oval 44">
+            <a:extLst>
+              <a:ext uri="{FF2B5EF4-FFF2-40B4-BE49-F238E27FC236}">
+                <a16:creationId xmlns:a16="http://schemas.microsoft.com/office/drawing/2014/main" id="{573E048C-8320-4528-9C20-D3C7AEAD1714}"/>
+              </a:ext>
+            </a:extLst>
+          </p:cNvPr>
+          <p:cNvSpPr/>
+          <p:nvPr/>
+        </p:nvSpPr>
+        <p:spPr>
+          <a:xfrm>
+            <a:off x="1706763" y="2776136"/>
+            <a:ext cx="256674" cy="248652"/>
+          </a:xfrm>
+          <a:prstGeom prst="ellipse">
+            <a:avLst/>
+          </a:prstGeom>
+          <a:solidFill>
+            <a:srgbClr val="5B9BD5">
+              <a:lumMod val="75000"/>
+            </a:srgbClr>
+          </a:solidFill>
+          <a:ln w="12700" cap="flat" cmpd="sng" algn="ctr">
+            <a:solidFill>
+              <a:srgbClr val="4472C4">
+                <a:shade val="50000"/>
+              </a:srgbClr>
+            </a:solidFill>
+            <a:prstDash val="solid"/>
+            <a:miter lim="800000"/>
+          </a:ln>
+          <a:effectLst/>
+        </p:spPr>
+        <p:txBody>
+          <a:bodyPr rtlCol="0" anchor="ctr"/>
+          <a:lstStyle/>
+          <a:p>
+            <a:pPr marL="0" marR="0" lvl="0" indent="0" algn="ctr" defTabSz="914400" rtl="0" eaLnBrk="1" fontAlgn="auto" latinLnBrk="0" hangingPunct="1">
+              <a:lnSpc>
+                <a:spcPct val="100000"/>
+              </a:lnSpc>
+              <a:spcBef>
+                <a:spcPts val="0"/>
+              </a:spcBef>
+              <a:spcAft>
+                <a:spcPts val="0"/>
+              </a:spcAft>
+              <a:buClrTx/>
+              <a:buSzTx/>
+              <a:buFontTx/>
+              <a:buNone/>
+              <a:tabLst/>
+              <a:defRPr/>
+            </a:pPr>
+            <a:r>
+              <a:rPr kumimoji="0" lang="en-AU" sz="1100" b="0" i="0" u="none" strike="noStrike" kern="0" cap="none" spc="0" normalizeH="0" baseline="0" noProof="0">
+                <a:ln>
+                  <a:noFill/>
+                </a:ln>
+                <a:solidFill>
+                  <a:prstClr val="white"/>
+                </a:solidFill>
+                <a:effectLst/>
+                <a:uLnTx/>
+                <a:uFillTx/>
+                <a:latin typeface="Verdana" panose="020B0604030504040204" pitchFamily="34" charset="0"/>
+                <a:ea typeface="Verdana" panose="020B0604030504040204" pitchFamily="34" charset="0"/>
+                <a:cs typeface="Tahoma" panose="020B0604030504040204" pitchFamily="34" charset="0"/>
+              </a:rPr>
+              <a:t>1</a:t>
+            </a:r>
+          </a:p>
+        </p:txBody>
+      </p:sp>
+    </p:spTree>
+    <p:extLst>
+      <p:ext uri="{BB962C8B-B14F-4D97-AF65-F5344CB8AC3E}">
+        <p14:creationId xmlns:p14="http://schemas.microsoft.com/office/powerpoint/2010/main" val="2923497652"/>
+      </p:ext>
+    </p:extLst>
+  </p:cSld>
+  <p:clrMapOvr>
+    <a:masterClrMapping/>
+  </p:clrMapOvr>
+  <p:transition/>
+  <p:timing>
+    <p:tnLst>
+      <p:par>
+        <p:cTn id="1" dur="indefinite" restart="never" nodeType="tmRoot">
+          <p:childTnLst>
+            <p:seq concurrent="1" nextAc="seek">
+              <p:cTn id="2" dur="indefinite" nodeType="mainSeq">
+                <p:childTnLst>
+                  <p:par>
+                    <p:cTn id="3" fill="hold">
+                      <p:stCondLst>
+                        <p:cond delay="indefinite"/>
+                      </p:stCondLst>
+                      <p:childTnLst>
+                        <p:par>
+                          <p:cTn id="4" fill="hold">
+                            <p:stCondLst>
+                              <p:cond delay="0"/>
+                            </p:stCondLst>
+                            <p:childTnLst>
+                              <p:par>
+                                <p:cTn id="5" presetID="1" presetClass="entr" presetSubtype="0" fill="hold" grpId="0" nodeType="clickEffect">
+                                  <p:stCondLst>
+                                    <p:cond delay="0"/>
+                                  </p:stCondLst>
+                                  <p:childTnLst>
+                                    <p:set>
+                                      <p:cBhvr>
+                                        <p:cTn id="6" dur="1" fill="hold">
+                                          <p:stCondLst>
+                                            <p:cond delay="0"/>
+                                          </p:stCondLst>
+                                        </p:cTn>
+                                        <p:tgtEl>
+                                          <p:spTgt spid="45"/>
+                                        </p:tgtEl>
+                                        <p:attrNameLst>
+                                          <p:attrName>style.visibility</p:attrName>
+                                        </p:attrNameLst>
+                                      </p:cBhvr>
+                                      <p:to>
+                                        <p:strVal val="visible"/>
+                                      </p:to>
+                                    </p:set>
+                                  </p:childTnLst>
+                                </p:cTn>
+                              </p:par>
+                              <p:par>
+                                <p:cTn id="7" presetID="1" presetClass="entr" presetSubtype="0" fill="hold" nodeType="withEffect">
+                                  <p:stCondLst>
+                                    <p:cond delay="0"/>
+                                  </p:stCondLst>
+                                  <p:childTnLst>
+                                    <p:set>
+                                      <p:cBhvr>
+                                        <p:cTn id="8" dur="1" fill="hold">
+                                          <p:stCondLst>
+                                            <p:cond delay="0"/>
+                                          </p:stCondLst>
+                                        </p:cTn>
+                                        <p:tgtEl>
+                                          <p:spTgt spid="46"/>
+                                        </p:tgtEl>
+                                        <p:attrNameLst>
+                                          <p:attrName>style.visibility</p:attrName>
+                                        </p:attrNameLst>
+                                      </p:cBhvr>
+                                      <p:to>
+                                        <p:strVal val="visible"/>
+                                      </p:to>
+                                    </p:set>
+                                  </p:childTnLst>
+                                </p:cTn>
+                              </p:par>
+                            </p:childTnLst>
+                          </p:cTn>
+                        </p:par>
+                      </p:childTnLst>
+                    </p:cTn>
+                  </p:par>
+                </p:childTnLst>
+              </p:cTn>
+              <p:prevCondLst>
+                <p:cond evt="onPrev" delay="0">
+                  <p:tgtEl>
+                    <p:sldTgt/>
+                  </p:tgtEl>
+                </p:cond>
+              </p:prevCondLst>
+              <p:nextCondLst>
+                <p:cond evt="onNext" delay="0">
+                  <p:tgtEl>
+                    <p:sldTgt/>
+                  </p:tgtEl>
+                </p:cond>
+              </p:nextCondLst>
+            </p:seq>
+          </p:childTnLst>
+        </p:cTn>
+      </p:par>
+    </p:tnLst>
+    <p:bldLst>
+      <p:bldP spid="45" grpId="0" animBg="1"/>
+    </p:bldLst>
+  </p:timing>
+</p:sld>
+</file>
+
 <file path=ppt/theme/theme1.xml><?xml version="1.0" encoding="utf-8"?>
 <a:theme xmlns:a="http://schemas.openxmlformats.org/drawingml/2006/main" name="Microsoft_Learn_White_Template">
   <a:themeElements>

</xml_diff>